<commit_message>
integrated SEEM's hot water draw patterns into REEDR. Also changed water mains temp to correlateWithWeather.
</commit_message>
<xml_diff>
--- a/Toolkit/Hot Water Schematic.pptx
+++ b/Toolkit/Hot Water Schematic.pptx
@@ -6,6 +6,7 @@
   </p:sldMasterIdLst>
   <p:sldIdLst>
     <p:sldId id="257" r:id="rId2"/>
+    <p:sldId id="258" r:id="rId3"/>
   </p:sldIdLst>
   <p:sldSz cx="12192000" cy="6858000"/>
   <p:notesSz cx="6858000" cy="9144000"/>
@@ -259,7 +260,7 @@
           <a:p>
             <a:fld id="{0607D8A2-203E-4449-90E1-8E7594B73DFC}" type="datetimeFigureOut">
               <a:rPr lang="en-US" smtClean="0"/>
-              <a:t>12/9/2022</a:t>
+              <a:t>12/20/2022</a:t>
             </a:fld>
             <a:endParaRPr lang="en-US"/>
           </a:p>
@@ -457,7 +458,7 @@
           <a:p>
             <a:fld id="{0607D8A2-203E-4449-90E1-8E7594B73DFC}" type="datetimeFigureOut">
               <a:rPr lang="en-US" smtClean="0"/>
-              <a:t>12/9/2022</a:t>
+              <a:t>12/20/2022</a:t>
             </a:fld>
             <a:endParaRPr lang="en-US"/>
           </a:p>
@@ -665,7 +666,7 @@
           <a:p>
             <a:fld id="{0607D8A2-203E-4449-90E1-8E7594B73DFC}" type="datetimeFigureOut">
               <a:rPr lang="en-US" smtClean="0"/>
-              <a:t>12/9/2022</a:t>
+              <a:t>12/20/2022</a:t>
             </a:fld>
             <a:endParaRPr lang="en-US"/>
           </a:p>
@@ -863,7 +864,7 @@
           <a:p>
             <a:fld id="{0607D8A2-203E-4449-90E1-8E7594B73DFC}" type="datetimeFigureOut">
               <a:rPr lang="en-US" smtClean="0"/>
-              <a:t>12/9/2022</a:t>
+              <a:t>12/20/2022</a:t>
             </a:fld>
             <a:endParaRPr lang="en-US"/>
           </a:p>
@@ -1138,7 +1139,7 @@
           <a:p>
             <a:fld id="{0607D8A2-203E-4449-90E1-8E7594B73DFC}" type="datetimeFigureOut">
               <a:rPr lang="en-US" smtClean="0"/>
-              <a:t>12/9/2022</a:t>
+              <a:t>12/20/2022</a:t>
             </a:fld>
             <a:endParaRPr lang="en-US"/>
           </a:p>
@@ -1403,7 +1404,7 @@
           <a:p>
             <a:fld id="{0607D8A2-203E-4449-90E1-8E7594B73DFC}" type="datetimeFigureOut">
               <a:rPr lang="en-US" smtClean="0"/>
-              <a:t>12/9/2022</a:t>
+              <a:t>12/20/2022</a:t>
             </a:fld>
             <a:endParaRPr lang="en-US"/>
           </a:p>
@@ -1815,7 +1816,7 @@
           <a:p>
             <a:fld id="{0607D8A2-203E-4449-90E1-8E7594B73DFC}" type="datetimeFigureOut">
               <a:rPr lang="en-US" smtClean="0"/>
-              <a:t>12/9/2022</a:t>
+              <a:t>12/20/2022</a:t>
             </a:fld>
             <a:endParaRPr lang="en-US"/>
           </a:p>
@@ -1956,7 +1957,7 @@
           <a:p>
             <a:fld id="{0607D8A2-203E-4449-90E1-8E7594B73DFC}" type="datetimeFigureOut">
               <a:rPr lang="en-US" smtClean="0"/>
-              <a:t>12/9/2022</a:t>
+              <a:t>12/20/2022</a:t>
             </a:fld>
             <a:endParaRPr lang="en-US"/>
           </a:p>
@@ -2069,7 +2070,7 @@
           <a:p>
             <a:fld id="{0607D8A2-203E-4449-90E1-8E7594B73DFC}" type="datetimeFigureOut">
               <a:rPr lang="en-US" smtClean="0"/>
-              <a:t>12/9/2022</a:t>
+              <a:t>12/20/2022</a:t>
             </a:fld>
             <a:endParaRPr lang="en-US"/>
           </a:p>
@@ -2380,7 +2381,7 @@
           <a:p>
             <a:fld id="{0607D8A2-203E-4449-90E1-8E7594B73DFC}" type="datetimeFigureOut">
               <a:rPr lang="en-US" smtClean="0"/>
-              <a:t>12/9/2022</a:t>
+              <a:t>12/20/2022</a:t>
             </a:fld>
             <a:endParaRPr lang="en-US"/>
           </a:p>
@@ -2668,7 +2669,7 @@
           <a:p>
             <a:fld id="{0607D8A2-203E-4449-90E1-8E7594B73DFC}" type="datetimeFigureOut">
               <a:rPr lang="en-US" smtClean="0"/>
-              <a:t>12/9/2022</a:t>
+              <a:t>12/20/2022</a:t>
             </a:fld>
             <a:endParaRPr lang="en-US"/>
           </a:p>
@@ -2909,7 +2910,7 @@
           <a:p>
             <a:fld id="{0607D8A2-203E-4449-90E1-8E7594B73DFC}" type="datetimeFigureOut">
               <a:rPr lang="en-US" smtClean="0"/>
-              <a:t>12/9/2022</a:t>
+              <a:t>12/20/2022</a:t>
             </a:fld>
             <a:endParaRPr lang="en-US"/>
           </a:p>
@@ -5379,7 +5380,7 @@
                   <a:schemeClr val="accent1"/>
                 </a:solidFill>
               </a:rPr>
-              <a:t>DHW Demand Inlet Node</a:t>
+              <a:t>Water Shower Inlet Node</a:t>
             </a:r>
           </a:p>
         </p:txBody>
@@ -5476,7 +5477,7 @@
                   <a:schemeClr val="tx1"/>
                 </a:solidFill>
               </a:rPr>
-              <a:t>DHW Demand Inlet Pipe</a:t>
+              <a:t>DHW Showers</a:t>
             </a:r>
           </a:p>
         </p:txBody>
@@ -5562,7 +5563,7 @@
                   <a:schemeClr val="accent1"/>
                 </a:solidFill>
               </a:rPr>
-              <a:t>DHW Demand Inlet Pipe Outlet Node</a:t>
+              <a:t>Water Shower Outlet Node</a:t>
             </a:r>
           </a:p>
         </p:txBody>
@@ -5654,7 +5655,7 @@
                   <a:schemeClr val="accent1"/>
                 </a:solidFill>
               </a:rPr>
-              <a:t>DHW Demand Inlet Branch</a:t>
+              <a:t>Water Shower Branch</a:t>
             </a:r>
           </a:p>
         </p:txBody>
@@ -5818,7 +5819,7 @@
                   <a:schemeClr val="accent1"/>
                 </a:solidFill>
               </a:rPr>
-              <a:t>DHW Demand Inlet Node</a:t>
+              <a:t>Water Sink Inlet Node</a:t>
             </a:r>
           </a:p>
         </p:txBody>
@@ -5915,7 +5916,7 @@
                   <a:schemeClr val="tx1"/>
                 </a:solidFill>
               </a:rPr>
-              <a:t>DHW Demand Inlet Pipe</a:t>
+              <a:t>DHW Sinks</a:t>
             </a:r>
           </a:p>
         </p:txBody>
@@ -6001,7 +6002,7 @@
                   <a:schemeClr val="accent1"/>
                 </a:solidFill>
               </a:rPr>
-              <a:t>DHW Demand Inlet Pipe Outlet Node</a:t>
+              <a:t>Water Sink outlet Node</a:t>
             </a:r>
           </a:p>
         </p:txBody>
@@ -6093,7 +6094,7 @@
                   <a:schemeClr val="accent1"/>
                 </a:solidFill>
               </a:rPr>
-              <a:t>DHW Demand Inlet Branch</a:t>
+              <a:t>Water Sink Branch</a:t>
             </a:r>
           </a:p>
         </p:txBody>
@@ -6196,8 +6197,8 @@
         </p:nvSpPr>
         <p:spPr>
           <a:xfrm>
-            <a:off x="6456185" y="4379762"/>
-            <a:ext cx="938073" cy="400110"/>
+            <a:off x="6392387" y="4379762"/>
+            <a:ext cx="1338360" cy="400110"/>
           </a:xfrm>
           <a:prstGeom prst="rect">
             <a:avLst/>
@@ -6217,7 +6218,23 @@
                   <a:schemeClr val="accent1"/>
                 </a:solidFill>
               </a:rPr>
-              <a:t>DHW Demand Inlet Node</a:t>
+              <a:t>Water </a:t>
+            </a:r>
+            <a:r>
+              <a:rPr lang="en-US" sz="1000" dirty="0" err="1">
+                <a:solidFill>
+                  <a:schemeClr val="accent1"/>
+                </a:solidFill>
+              </a:rPr>
+              <a:t>ClothesWasher</a:t>
+            </a:r>
+            <a:r>
+              <a:rPr lang="en-US" sz="1000" dirty="0">
+                <a:solidFill>
+                  <a:schemeClr val="accent1"/>
+                </a:solidFill>
+              </a:rPr>
+              <a:t> Inlet Node</a:t>
             </a:r>
           </a:p>
         </p:txBody>
@@ -6315,8 +6332,21 @@
                   <a:schemeClr val="tx1"/>
                 </a:solidFill>
               </a:rPr>
-              <a:t>DHW Demand Inlet Pipe</a:t>
-            </a:r>
+              <a:t>DHW </a:t>
+            </a:r>
+            <a:r>
+              <a:rPr lang="en-US" sz="900" b="1" dirty="0" err="1">
+                <a:solidFill>
+                  <a:schemeClr val="tx1"/>
+                </a:solidFill>
+              </a:rPr>
+              <a:t>ClothesWasher</a:t>
+            </a:r>
+            <a:endParaRPr lang="en-US" sz="900" b="1" dirty="0">
+              <a:solidFill>
+                <a:schemeClr val="tx1"/>
+              </a:solidFill>
+            </a:endParaRPr>
           </a:p>
         </p:txBody>
       </p:sp>
@@ -6380,8 +6410,8 @@
         </p:nvSpPr>
         <p:spPr>
           <a:xfrm>
-            <a:off x="4481313" y="4381578"/>
-            <a:ext cx="1202048" cy="400110"/>
+            <a:off x="4298979" y="4381578"/>
+            <a:ext cx="1384382" cy="400110"/>
           </a:xfrm>
           <a:prstGeom prst="rect">
             <a:avLst/>
@@ -6401,7 +6431,23 @@
                   <a:schemeClr val="accent1"/>
                 </a:solidFill>
               </a:rPr>
-              <a:t>DHW Demand Inlet Pipe Outlet Node</a:t>
+              <a:t>Water </a:t>
+            </a:r>
+            <a:r>
+              <a:rPr lang="en-US" sz="1000" dirty="0" err="1">
+                <a:solidFill>
+                  <a:schemeClr val="accent1"/>
+                </a:solidFill>
+              </a:rPr>
+              <a:t>ClothesWasher</a:t>
+            </a:r>
+            <a:r>
+              <a:rPr lang="en-US" sz="1000" dirty="0">
+                <a:solidFill>
+                  <a:schemeClr val="accent1"/>
+                </a:solidFill>
+              </a:rPr>
+              <a:t> Outlet Node</a:t>
             </a:r>
           </a:p>
         </p:txBody>
@@ -6493,7 +6539,23 @@
                   <a:schemeClr val="accent1"/>
                 </a:solidFill>
               </a:rPr>
-              <a:t>DHW Demand Inlet Branch</a:t>
+              <a:t>Water </a:t>
+            </a:r>
+            <a:r>
+              <a:rPr lang="en-US" sz="1100" b="1" dirty="0" err="1">
+                <a:solidFill>
+                  <a:schemeClr val="accent1"/>
+                </a:solidFill>
+              </a:rPr>
+              <a:t>ClothesWasher</a:t>
+            </a:r>
+            <a:r>
+              <a:rPr lang="en-US" sz="1100" b="1" dirty="0">
+                <a:solidFill>
+                  <a:schemeClr val="accent1"/>
+                </a:solidFill>
+              </a:rPr>
+              <a:t> Branch</a:t>
             </a:r>
           </a:p>
         </p:txBody>
@@ -6597,8 +6659,8 @@
         </p:nvSpPr>
         <p:spPr>
           <a:xfrm>
-            <a:off x="6474820" y="5366742"/>
-            <a:ext cx="938073" cy="400110"/>
+            <a:off x="6382438" y="5366742"/>
+            <a:ext cx="1202048" cy="400110"/>
           </a:xfrm>
           <a:prstGeom prst="rect">
             <a:avLst/>
@@ -6618,7 +6680,23 @@
                   <a:schemeClr val="accent1"/>
                 </a:solidFill>
               </a:rPr>
-              <a:t>DHW Demand Inlet Node</a:t>
+              <a:t>Water </a:t>
+            </a:r>
+            <a:r>
+              <a:rPr lang="en-US" sz="1000" dirty="0" err="1">
+                <a:solidFill>
+                  <a:schemeClr val="accent1"/>
+                </a:solidFill>
+              </a:rPr>
+              <a:t>DishWasher</a:t>
+            </a:r>
+            <a:r>
+              <a:rPr lang="en-US" sz="1000" dirty="0">
+                <a:solidFill>
+                  <a:schemeClr val="accent1"/>
+                </a:solidFill>
+              </a:rPr>
+              <a:t> Inlet Node</a:t>
             </a:r>
           </a:p>
         </p:txBody>
@@ -6715,8 +6793,21 @@
                   <a:schemeClr val="tx1"/>
                 </a:solidFill>
               </a:rPr>
-              <a:t>DHW Demand Inlet Pipe</a:t>
-            </a:r>
+              <a:t>DHW </a:t>
+            </a:r>
+            <a:r>
+              <a:rPr lang="en-US" sz="900" b="1" dirty="0" err="1">
+                <a:solidFill>
+                  <a:schemeClr val="tx1"/>
+                </a:solidFill>
+              </a:rPr>
+              <a:t>DishWasher</a:t>
+            </a:r>
+            <a:endParaRPr lang="en-US" sz="900" b="1" dirty="0">
+              <a:solidFill>
+                <a:schemeClr val="tx1"/>
+              </a:solidFill>
+            </a:endParaRPr>
           </a:p>
         </p:txBody>
       </p:sp>
@@ -6801,7 +6892,23 @@
                   <a:schemeClr val="accent1"/>
                 </a:solidFill>
               </a:rPr>
-              <a:t>DHW Demand Inlet Pipe Outlet Node</a:t>
+              <a:t>Water </a:t>
+            </a:r>
+            <a:r>
+              <a:rPr lang="en-US" sz="1000" dirty="0" err="1">
+                <a:solidFill>
+                  <a:schemeClr val="accent1"/>
+                </a:solidFill>
+              </a:rPr>
+              <a:t>DishWasher</a:t>
+            </a:r>
+            <a:r>
+              <a:rPr lang="en-US" sz="1000" dirty="0">
+                <a:solidFill>
+                  <a:schemeClr val="accent1"/>
+                </a:solidFill>
+              </a:rPr>
+              <a:t> outlet Node</a:t>
             </a:r>
           </a:p>
         </p:txBody>
@@ -6893,7 +7000,7 @@
                   <a:schemeClr val="accent1"/>
                 </a:solidFill>
               </a:rPr>
-              <a:t>DHW Demand Inlet Branch</a:t>
+              <a:t>Washer Dishwasher Branch</a:t>
             </a:r>
           </a:p>
         </p:txBody>
@@ -7017,7 +7124,7 @@
                   <a:schemeClr val="accent1"/>
                 </a:solidFill>
               </a:rPr>
-              <a:t>DHW Demand Inlet Node</a:t>
+              <a:t>Water Bath Inlet Node</a:t>
             </a:r>
           </a:p>
         </p:txBody>
@@ -7114,7 +7221,7 @@
                   <a:schemeClr val="tx1"/>
                 </a:solidFill>
               </a:rPr>
-              <a:t>DHW Demand Inlet Pipe</a:t>
+              <a:t>DHW Baths</a:t>
             </a:r>
           </a:p>
         </p:txBody>
@@ -7179,8 +7286,8 @@
         </p:nvSpPr>
         <p:spPr>
           <a:xfrm>
-            <a:off x="4510477" y="6350834"/>
-            <a:ext cx="1202048" cy="400110"/>
+            <a:off x="4743377" y="6350834"/>
+            <a:ext cx="1032946" cy="400110"/>
           </a:xfrm>
           <a:prstGeom prst="rect">
             <a:avLst/>
@@ -7200,7 +7307,7 @@
                   <a:schemeClr val="accent1"/>
                 </a:solidFill>
               </a:rPr>
-              <a:t>DHW Demand Inlet Pipe Outlet Node</a:t>
+              <a:t>Water Bath Outlet Node</a:t>
             </a:r>
           </a:p>
         </p:txBody>
@@ -7292,7 +7399,7 @@
                   <a:schemeClr val="accent1"/>
                 </a:solidFill>
               </a:rPr>
-              <a:t>DHW Demand Inlet Branch</a:t>
+              <a:t>Water Bath Branch</a:t>
             </a:r>
           </a:p>
         </p:txBody>
@@ -8366,10 +8473,3240 @@
           </a:p>
         </p:txBody>
       </p:sp>
+      <p:sp>
+        <p:nvSpPr>
+          <p:cNvPr id="2" name="TextBox 1">
+            <a:extLst>
+              <a:ext uri="{FF2B5EF4-FFF2-40B4-BE49-F238E27FC236}">
+                <a16:creationId xmlns:a16="http://schemas.microsoft.com/office/drawing/2014/main" id="{7AC76D83-7C32-2BDD-3A11-83E7ED3ABF13}"/>
+              </a:ext>
+            </a:extLst>
+          </p:cNvPr>
+          <p:cNvSpPr txBox="1"/>
+          <p:nvPr/>
+        </p:nvSpPr>
+        <p:spPr>
+          <a:xfrm>
+            <a:off x="599401" y="5694888"/>
+            <a:ext cx="2720156" cy="646331"/>
+          </a:xfrm>
+          <a:prstGeom prst="rect">
+            <a:avLst/>
+          </a:prstGeom>
+          <a:effectLst>
+            <a:outerShdw blurRad="50800" dist="38100" dir="2700000" algn="tl" rotWithShape="0">
+              <a:prstClr val="black">
+                <a:alpha val="40000"/>
+              </a:prstClr>
+            </a:outerShdw>
+          </a:effectLst>
+        </p:spPr>
+        <p:style>
+          <a:lnRef idx="1">
+            <a:schemeClr val="accent4"/>
+          </a:lnRef>
+          <a:fillRef idx="2">
+            <a:schemeClr val="accent4"/>
+          </a:fillRef>
+          <a:effectRef idx="1">
+            <a:schemeClr val="accent4"/>
+          </a:effectRef>
+          <a:fontRef idx="minor">
+            <a:schemeClr val="dk1"/>
+          </a:fontRef>
+        </p:style>
+        <p:txBody>
+          <a:bodyPr wrap="square" rtlCol="0">
+            <a:spAutoFit/>
+          </a:bodyPr>
+          <a:lstStyle/>
+          <a:p>
+            <a:r>
+              <a:rPr lang="en-US" dirty="0"/>
+              <a:t>Original PNNL Prototype Hot Water Schematic</a:t>
+            </a:r>
+          </a:p>
+        </p:txBody>
+      </p:sp>
     </p:spTree>
     <p:extLst>
       <p:ext uri="{BB962C8B-B14F-4D97-AF65-F5344CB8AC3E}">
         <p14:creationId xmlns:p14="http://schemas.microsoft.com/office/powerpoint/2010/main" val="2073413860"/>
+      </p:ext>
+    </p:extLst>
+  </p:cSld>
+  <p:clrMapOvr>
+    <a:masterClrMapping/>
+  </p:clrMapOvr>
+</p:sld>
+</file>
+
+<file path=ppt/slides/slide2.xml><?xml version="1.0" encoding="utf-8"?>
+<p:sld xmlns:a="http://schemas.openxmlformats.org/drawingml/2006/main" xmlns:r="http://schemas.openxmlformats.org/officeDocument/2006/relationships" xmlns:p="http://schemas.openxmlformats.org/presentationml/2006/main">
+  <p:cSld>
+    <p:spTree>
+      <p:nvGrpSpPr>
+        <p:cNvPr id="1" name=""/>
+        <p:cNvGrpSpPr/>
+        <p:nvPr/>
+      </p:nvGrpSpPr>
+      <p:grpSpPr>
+        <a:xfrm>
+          <a:off x="0" y="0"/>
+          <a:ext cx="0" cy="0"/>
+          <a:chOff x="0" y="0"/>
+          <a:chExt cx="0" cy="0"/>
+        </a:xfrm>
+      </p:grpSpPr>
+      <p:sp>
+        <p:nvSpPr>
+          <p:cNvPr id="4" name="Rectangle 3">
+            <a:extLst>
+              <a:ext uri="{FF2B5EF4-FFF2-40B4-BE49-F238E27FC236}">
+                <a16:creationId xmlns:a16="http://schemas.microsoft.com/office/drawing/2014/main" id="{35C1DD06-297B-0A85-F434-D181E03EC934}"/>
+              </a:ext>
+            </a:extLst>
+          </p:cNvPr>
+          <p:cNvSpPr/>
+          <p:nvPr/>
+        </p:nvSpPr>
+        <p:spPr>
+          <a:xfrm>
+            <a:off x="2302489" y="851340"/>
+            <a:ext cx="720436" cy="600364"/>
+          </a:xfrm>
+          <a:prstGeom prst="rect">
+            <a:avLst/>
+          </a:prstGeom>
+          <a:solidFill>
+            <a:schemeClr val="tx1"/>
+          </a:solidFill>
+        </p:spPr>
+        <p:style>
+          <a:lnRef idx="2">
+            <a:schemeClr val="accent1">
+              <a:shade val="50000"/>
+            </a:schemeClr>
+          </a:lnRef>
+          <a:fillRef idx="1">
+            <a:schemeClr val="accent1"/>
+          </a:fillRef>
+          <a:effectRef idx="0">
+            <a:schemeClr val="accent1"/>
+          </a:effectRef>
+          <a:fontRef idx="minor">
+            <a:schemeClr val="lt1"/>
+          </a:fontRef>
+        </p:style>
+        <p:txBody>
+          <a:bodyPr rtlCol="0" anchor="ctr"/>
+          <a:lstStyle/>
+          <a:p>
+            <a:pPr algn="ctr"/>
+            <a:r>
+              <a:rPr lang="en-US" sz="1000" b="1" dirty="0"/>
+              <a:t>Mains Pressure (Pump)</a:t>
+            </a:r>
+          </a:p>
+        </p:txBody>
+      </p:sp>
+      <p:cxnSp>
+        <p:nvCxnSpPr>
+          <p:cNvPr id="6" name="Straight Connector 5">
+            <a:extLst>
+              <a:ext uri="{FF2B5EF4-FFF2-40B4-BE49-F238E27FC236}">
+                <a16:creationId xmlns:a16="http://schemas.microsoft.com/office/drawing/2014/main" id="{E124CE36-0E29-5C16-BFBC-CD1C587289AB}"/>
+              </a:ext>
+            </a:extLst>
+          </p:cNvPr>
+          <p:cNvCxnSpPr>
+            <a:cxnSpLocks/>
+            <a:endCxn id="4" idx="1"/>
+          </p:cNvCxnSpPr>
+          <p:nvPr/>
+        </p:nvCxnSpPr>
+        <p:spPr>
+          <a:xfrm flipV="1">
+            <a:off x="637918" y="1151522"/>
+            <a:ext cx="1664571" cy="5426"/>
+          </a:xfrm>
+          <a:prstGeom prst="line">
+            <a:avLst/>
+          </a:prstGeom>
+        </p:spPr>
+        <p:style>
+          <a:lnRef idx="1">
+            <a:schemeClr val="accent1"/>
+          </a:lnRef>
+          <a:fillRef idx="0">
+            <a:schemeClr val="accent1"/>
+          </a:fillRef>
+          <a:effectRef idx="0">
+            <a:schemeClr val="accent1"/>
+          </a:effectRef>
+          <a:fontRef idx="minor">
+            <a:schemeClr val="tx1"/>
+          </a:fontRef>
+        </p:style>
+      </p:cxnSp>
+      <p:cxnSp>
+        <p:nvCxnSpPr>
+          <p:cNvPr id="8" name="Straight Connector 7">
+            <a:extLst>
+              <a:ext uri="{FF2B5EF4-FFF2-40B4-BE49-F238E27FC236}">
+                <a16:creationId xmlns:a16="http://schemas.microsoft.com/office/drawing/2014/main" id="{04362A65-2485-FD49-A94C-22785AEB6113}"/>
+              </a:ext>
+            </a:extLst>
+          </p:cNvPr>
+          <p:cNvCxnSpPr>
+            <a:cxnSpLocks/>
+            <a:stCxn id="4" idx="3"/>
+          </p:cNvCxnSpPr>
+          <p:nvPr/>
+        </p:nvCxnSpPr>
+        <p:spPr>
+          <a:xfrm>
+            <a:off x="3022925" y="1151522"/>
+            <a:ext cx="1247417" cy="0"/>
+          </a:xfrm>
+          <a:prstGeom prst="line">
+            <a:avLst/>
+          </a:prstGeom>
+        </p:spPr>
+        <p:style>
+          <a:lnRef idx="1">
+            <a:schemeClr val="accent1"/>
+          </a:lnRef>
+          <a:fillRef idx="0">
+            <a:schemeClr val="accent1"/>
+          </a:fillRef>
+          <a:effectRef idx="0">
+            <a:schemeClr val="accent1"/>
+          </a:effectRef>
+          <a:fontRef idx="minor">
+            <a:schemeClr val="tx1"/>
+          </a:fontRef>
+        </p:style>
+      </p:cxnSp>
+      <p:sp>
+        <p:nvSpPr>
+          <p:cNvPr id="12" name="Oval 11">
+            <a:extLst>
+              <a:ext uri="{FF2B5EF4-FFF2-40B4-BE49-F238E27FC236}">
+                <a16:creationId xmlns:a16="http://schemas.microsoft.com/office/drawing/2014/main" id="{B23602F4-0CEB-FF00-4C33-15160EE16533}"/>
+              </a:ext>
+            </a:extLst>
+          </p:cNvPr>
+          <p:cNvSpPr/>
+          <p:nvPr/>
+        </p:nvSpPr>
+        <p:spPr>
+          <a:xfrm>
+            <a:off x="1423432" y="1094104"/>
+            <a:ext cx="133165" cy="114156"/>
+          </a:xfrm>
+          <a:prstGeom prst="ellipse">
+            <a:avLst/>
+          </a:prstGeom>
+        </p:spPr>
+        <p:style>
+          <a:lnRef idx="2">
+            <a:schemeClr val="accent1">
+              <a:shade val="50000"/>
+            </a:schemeClr>
+          </a:lnRef>
+          <a:fillRef idx="1">
+            <a:schemeClr val="accent1"/>
+          </a:fillRef>
+          <a:effectRef idx="0">
+            <a:schemeClr val="accent1"/>
+          </a:effectRef>
+          <a:fontRef idx="minor">
+            <a:schemeClr val="lt1"/>
+          </a:fontRef>
+        </p:style>
+        <p:txBody>
+          <a:bodyPr rtlCol="0" anchor="ctr"/>
+          <a:lstStyle/>
+          <a:p>
+            <a:pPr algn="ctr"/>
+            <a:endParaRPr lang="en-US"/>
+          </a:p>
+        </p:txBody>
+      </p:sp>
+      <p:sp>
+        <p:nvSpPr>
+          <p:cNvPr id="13" name="Oval 12">
+            <a:extLst>
+              <a:ext uri="{FF2B5EF4-FFF2-40B4-BE49-F238E27FC236}">
+                <a16:creationId xmlns:a16="http://schemas.microsoft.com/office/drawing/2014/main" id="{471005DD-CEB9-605E-420B-538251866CC0}"/>
+              </a:ext>
+            </a:extLst>
+          </p:cNvPr>
+          <p:cNvSpPr/>
+          <p:nvPr/>
+        </p:nvSpPr>
+        <p:spPr>
+          <a:xfrm>
+            <a:off x="3491961" y="1094444"/>
+            <a:ext cx="133165" cy="114156"/>
+          </a:xfrm>
+          <a:prstGeom prst="ellipse">
+            <a:avLst/>
+          </a:prstGeom>
+        </p:spPr>
+        <p:style>
+          <a:lnRef idx="2">
+            <a:schemeClr val="accent1">
+              <a:shade val="50000"/>
+            </a:schemeClr>
+          </a:lnRef>
+          <a:fillRef idx="1">
+            <a:schemeClr val="accent1"/>
+          </a:fillRef>
+          <a:effectRef idx="0">
+            <a:schemeClr val="accent1"/>
+          </a:effectRef>
+          <a:fontRef idx="minor">
+            <a:schemeClr val="lt1"/>
+          </a:fontRef>
+        </p:style>
+        <p:txBody>
+          <a:bodyPr rtlCol="0" anchor="ctr"/>
+          <a:lstStyle/>
+          <a:p>
+            <a:pPr algn="ctr"/>
+            <a:endParaRPr lang="en-US"/>
+          </a:p>
+        </p:txBody>
+      </p:sp>
+      <p:sp>
+        <p:nvSpPr>
+          <p:cNvPr id="14" name="TextBox 13">
+            <a:extLst>
+              <a:ext uri="{FF2B5EF4-FFF2-40B4-BE49-F238E27FC236}">
+                <a16:creationId xmlns:a16="http://schemas.microsoft.com/office/drawing/2014/main" id="{B37C37DD-7498-3F20-3374-B90379A9B10B}"/>
+              </a:ext>
+            </a:extLst>
+          </p:cNvPr>
+          <p:cNvSpPr txBox="1"/>
+          <p:nvPr/>
+        </p:nvSpPr>
+        <p:spPr>
+          <a:xfrm>
+            <a:off x="1109621" y="1256740"/>
+            <a:ext cx="938073" cy="400110"/>
+          </a:xfrm>
+          <a:prstGeom prst="rect">
+            <a:avLst/>
+          </a:prstGeom>
+          <a:noFill/>
+        </p:spPr>
+        <p:txBody>
+          <a:bodyPr wrap="square" rtlCol="0">
+            <a:spAutoFit/>
+          </a:bodyPr>
+          <a:lstStyle/>
+          <a:p>
+            <a:pPr algn="ctr"/>
+            <a:r>
+              <a:rPr lang="en-US" sz="1000" dirty="0">
+                <a:solidFill>
+                  <a:schemeClr val="accent1"/>
+                </a:solidFill>
+              </a:rPr>
+              <a:t>Mains Inlet Node</a:t>
+            </a:r>
+          </a:p>
+        </p:txBody>
+      </p:sp>
+      <p:sp>
+        <p:nvSpPr>
+          <p:cNvPr id="15" name="TextBox 14">
+            <a:extLst>
+              <a:ext uri="{FF2B5EF4-FFF2-40B4-BE49-F238E27FC236}">
+                <a16:creationId xmlns:a16="http://schemas.microsoft.com/office/drawing/2014/main" id="{48B58476-8AE8-6783-5D4D-013A85657BFF}"/>
+              </a:ext>
+            </a:extLst>
+          </p:cNvPr>
+          <p:cNvSpPr txBox="1"/>
+          <p:nvPr/>
+        </p:nvSpPr>
+        <p:spPr>
+          <a:xfrm>
+            <a:off x="2968827" y="1215481"/>
+            <a:ext cx="1084749" cy="400110"/>
+          </a:xfrm>
+          <a:prstGeom prst="rect">
+            <a:avLst/>
+          </a:prstGeom>
+          <a:noFill/>
+        </p:spPr>
+        <p:txBody>
+          <a:bodyPr wrap="square" rtlCol="0">
+            <a:spAutoFit/>
+          </a:bodyPr>
+          <a:lstStyle/>
+          <a:p>
+            <a:pPr algn="ctr"/>
+            <a:r>
+              <a:rPr lang="en-US" sz="1000" dirty="0">
+                <a:solidFill>
+                  <a:schemeClr val="accent1"/>
+                </a:solidFill>
+              </a:rPr>
+              <a:t>Mains Pressure Outlet Node</a:t>
+            </a:r>
+          </a:p>
+        </p:txBody>
+      </p:sp>
+      <p:sp>
+        <p:nvSpPr>
+          <p:cNvPr id="17" name="Flowchart: Manual Operation 16">
+            <a:extLst>
+              <a:ext uri="{FF2B5EF4-FFF2-40B4-BE49-F238E27FC236}">
+                <a16:creationId xmlns:a16="http://schemas.microsoft.com/office/drawing/2014/main" id="{EFEB59B6-448D-195C-65BA-4B7DF06EBC8E}"/>
+              </a:ext>
+            </a:extLst>
+          </p:cNvPr>
+          <p:cNvSpPr/>
+          <p:nvPr/>
+        </p:nvSpPr>
+        <p:spPr>
+          <a:xfrm rot="5400000">
+            <a:off x="4136977" y="875855"/>
+            <a:ext cx="800188" cy="533459"/>
+          </a:xfrm>
+          <a:prstGeom prst="flowChartManualOperation">
+            <a:avLst/>
+          </a:prstGeom>
+          <a:solidFill>
+            <a:schemeClr val="accent2">
+              <a:lumMod val="60000"/>
+              <a:lumOff val="40000"/>
+            </a:schemeClr>
+          </a:solidFill>
+        </p:spPr>
+        <p:style>
+          <a:lnRef idx="2">
+            <a:schemeClr val="accent2">
+              <a:shade val="50000"/>
+            </a:schemeClr>
+          </a:lnRef>
+          <a:fillRef idx="1">
+            <a:schemeClr val="accent2"/>
+          </a:fillRef>
+          <a:effectRef idx="0">
+            <a:schemeClr val="accent2"/>
+          </a:effectRef>
+          <a:fontRef idx="minor">
+            <a:schemeClr val="lt1"/>
+          </a:fontRef>
+        </p:style>
+        <p:txBody>
+          <a:bodyPr rtlCol="0" anchor="ctr"/>
+          <a:lstStyle/>
+          <a:p>
+            <a:pPr algn="ctr"/>
+            <a:endParaRPr lang="en-US"/>
+          </a:p>
+        </p:txBody>
+      </p:sp>
+      <p:cxnSp>
+        <p:nvCxnSpPr>
+          <p:cNvPr id="18" name="Straight Connector 17">
+            <a:extLst>
+              <a:ext uri="{FF2B5EF4-FFF2-40B4-BE49-F238E27FC236}">
+                <a16:creationId xmlns:a16="http://schemas.microsoft.com/office/drawing/2014/main" id="{9E5C5928-13A6-EC64-EB70-E2A57DD04205}"/>
+              </a:ext>
+            </a:extLst>
+          </p:cNvPr>
+          <p:cNvCxnSpPr>
+            <a:cxnSpLocks/>
+            <a:stCxn id="17" idx="0"/>
+            <a:endCxn id="22" idx="1"/>
+          </p:cNvCxnSpPr>
+          <p:nvPr/>
+        </p:nvCxnSpPr>
+        <p:spPr>
+          <a:xfrm flipV="1">
+            <a:off x="4803801" y="1142584"/>
+            <a:ext cx="1077336" cy="1"/>
+          </a:xfrm>
+          <a:prstGeom prst="line">
+            <a:avLst/>
+          </a:prstGeom>
+        </p:spPr>
+        <p:style>
+          <a:lnRef idx="1">
+            <a:schemeClr val="accent1"/>
+          </a:lnRef>
+          <a:fillRef idx="0">
+            <a:schemeClr val="accent1"/>
+          </a:fillRef>
+          <a:effectRef idx="0">
+            <a:schemeClr val="accent1"/>
+          </a:effectRef>
+          <a:fontRef idx="minor">
+            <a:schemeClr val="tx1"/>
+          </a:fontRef>
+        </p:style>
+      </p:cxnSp>
+      <p:sp>
+        <p:nvSpPr>
+          <p:cNvPr id="22" name="Rectangle 21">
+            <a:extLst>
+              <a:ext uri="{FF2B5EF4-FFF2-40B4-BE49-F238E27FC236}">
+                <a16:creationId xmlns:a16="http://schemas.microsoft.com/office/drawing/2014/main" id="{C3F01C3C-C920-B430-45B6-01E45A8345E1}"/>
+              </a:ext>
+            </a:extLst>
+          </p:cNvPr>
+          <p:cNvSpPr/>
+          <p:nvPr/>
+        </p:nvSpPr>
+        <p:spPr>
+          <a:xfrm>
+            <a:off x="5881137" y="842402"/>
+            <a:ext cx="720436" cy="600364"/>
+          </a:xfrm>
+          <a:prstGeom prst="rect">
+            <a:avLst/>
+          </a:prstGeom>
+          <a:solidFill>
+            <a:srgbClr val="FF0000"/>
+          </a:solidFill>
+        </p:spPr>
+        <p:style>
+          <a:lnRef idx="2">
+            <a:schemeClr val="accent1">
+              <a:shade val="50000"/>
+            </a:schemeClr>
+          </a:lnRef>
+          <a:fillRef idx="1">
+            <a:schemeClr val="accent1"/>
+          </a:fillRef>
+          <a:effectRef idx="0">
+            <a:schemeClr val="accent1"/>
+          </a:effectRef>
+          <a:fontRef idx="minor">
+            <a:schemeClr val="lt1"/>
+          </a:fontRef>
+        </p:style>
+        <p:txBody>
+          <a:bodyPr rtlCol="0" anchor="ctr"/>
+          <a:lstStyle/>
+          <a:p>
+            <a:pPr algn="ctr"/>
+            <a:r>
+              <a:rPr lang="en-US" sz="1000" b="1" dirty="0"/>
+              <a:t>Water Heater</a:t>
+            </a:r>
+          </a:p>
+        </p:txBody>
+      </p:sp>
+      <p:sp>
+        <p:nvSpPr>
+          <p:cNvPr id="25" name="Oval 24">
+            <a:extLst>
+              <a:ext uri="{FF2B5EF4-FFF2-40B4-BE49-F238E27FC236}">
+                <a16:creationId xmlns:a16="http://schemas.microsoft.com/office/drawing/2014/main" id="{7DA01BC1-955B-C3C6-2B10-5EC25468B630}"/>
+              </a:ext>
+            </a:extLst>
+          </p:cNvPr>
+          <p:cNvSpPr/>
+          <p:nvPr/>
+        </p:nvSpPr>
+        <p:spPr>
+          <a:xfrm>
+            <a:off x="5267906" y="1085506"/>
+            <a:ext cx="133165" cy="114156"/>
+          </a:xfrm>
+          <a:prstGeom prst="ellipse">
+            <a:avLst/>
+          </a:prstGeom>
+        </p:spPr>
+        <p:style>
+          <a:lnRef idx="2">
+            <a:schemeClr val="accent1">
+              <a:shade val="50000"/>
+            </a:schemeClr>
+          </a:lnRef>
+          <a:fillRef idx="1">
+            <a:schemeClr val="accent1"/>
+          </a:fillRef>
+          <a:effectRef idx="0">
+            <a:schemeClr val="accent1"/>
+          </a:effectRef>
+          <a:fontRef idx="minor">
+            <a:schemeClr val="lt1"/>
+          </a:fontRef>
+        </p:style>
+        <p:txBody>
+          <a:bodyPr rtlCol="0" anchor="ctr"/>
+          <a:lstStyle/>
+          <a:p>
+            <a:pPr algn="ctr"/>
+            <a:endParaRPr lang="en-US"/>
+          </a:p>
+        </p:txBody>
+      </p:sp>
+      <p:sp>
+        <p:nvSpPr>
+          <p:cNvPr id="26" name="Oval 25">
+            <a:extLst>
+              <a:ext uri="{FF2B5EF4-FFF2-40B4-BE49-F238E27FC236}">
+                <a16:creationId xmlns:a16="http://schemas.microsoft.com/office/drawing/2014/main" id="{3490AD28-7555-D493-09BF-141135A54C65}"/>
+              </a:ext>
+            </a:extLst>
+          </p:cNvPr>
+          <p:cNvSpPr/>
+          <p:nvPr/>
+        </p:nvSpPr>
+        <p:spPr>
+          <a:xfrm>
+            <a:off x="7070609" y="1085506"/>
+            <a:ext cx="133165" cy="114156"/>
+          </a:xfrm>
+          <a:prstGeom prst="ellipse">
+            <a:avLst/>
+          </a:prstGeom>
+        </p:spPr>
+        <p:style>
+          <a:lnRef idx="2">
+            <a:schemeClr val="accent1">
+              <a:shade val="50000"/>
+            </a:schemeClr>
+          </a:lnRef>
+          <a:fillRef idx="1">
+            <a:schemeClr val="accent1"/>
+          </a:fillRef>
+          <a:effectRef idx="0">
+            <a:schemeClr val="accent1"/>
+          </a:effectRef>
+          <a:fontRef idx="minor">
+            <a:schemeClr val="lt1"/>
+          </a:fontRef>
+        </p:style>
+        <p:txBody>
+          <a:bodyPr rtlCol="0" anchor="ctr"/>
+          <a:lstStyle/>
+          <a:p>
+            <a:pPr algn="ctr"/>
+            <a:endParaRPr lang="en-US"/>
+          </a:p>
+        </p:txBody>
+      </p:sp>
+      <p:sp>
+        <p:nvSpPr>
+          <p:cNvPr id="27" name="TextBox 26">
+            <a:extLst>
+              <a:ext uri="{FF2B5EF4-FFF2-40B4-BE49-F238E27FC236}">
+                <a16:creationId xmlns:a16="http://schemas.microsoft.com/office/drawing/2014/main" id="{CB6432C1-300E-0F9B-371C-C529F28EC90D}"/>
+              </a:ext>
+            </a:extLst>
+          </p:cNvPr>
+          <p:cNvSpPr txBox="1"/>
+          <p:nvPr/>
+        </p:nvSpPr>
+        <p:spPr>
+          <a:xfrm>
+            <a:off x="4914396" y="1204792"/>
+            <a:ext cx="1038346" cy="400110"/>
+          </a:xfrm>
+          <a:prstGeom prst="rect">
+            <a:avLst/>
+          </a:prstGeom>
+          <a:noFill/>
+        </p:spPr>
+        <p:txBody>
+          <a:bodyPr wrap="square" rtlCol="0">
+            <a:spAutoFit/>
+          </a:bodyPr>
+          <a:lstStyle/>
+          <a:p>
+            <a:pPr algn="ctr"/>
+            <a:r>
+              <a:rPr lang="en-US" sz="1000" dirty="0">
+                <a:solidFill>
+                  <a:schemeClr val="accent1"/>
+                </a:solidFill>
+              </a:rPr>
+              <a:t>Water Heater Use Inlet Node</a:t>
+            </a:r>
+          </a:p>
+        </p:txBody>
+      </p:sp>
+      <p:sp>
+        <p:nvSpPr>
+          <p:cNvPr id="28" name="TextBox 27">
+            <a:extLst>
+              <a:ext uri="{FF2B5EF4-FFF2-40B4-BE49-F238E27FC236}">
+                <a16:creationId xmlns:a16="http://schemas.microsoft.com/office/drawing/2014/main" id="{A391FF8C-12C2-3CEA-1479-B2232D501CB8}"/>
+              </a:ext>
+            </a:extLst>
+          </p:cNvPr>
+          <p:cNvSpPr txBox="1"/>
+          <p:nvPr/>
+        </p:nvSpPr>
+        <p:spPr>
+          <a:xfrm>
+            <a:off x="6586700" y="1199670"/>
+            <a:ext cx="1078224" cy="400110"/>
+          </a:xfrm>
+          <a:prstGeom prst="rect">
+            <a:avLst/>
+          </a:prstGeom>
+          <a:noFill/>
+        </p:spPr>
+        <p:txBody>
+          <a:bodyPr wrap="square" rtlCol="0">
+            <a:spAutoFit/>
+          </a:bodyPr>
+          <a:lstStyle/>
+          <a:p>
+            <a:pPr algn="ctr"/>
+            <a:r>
+              <a:rPr lang="en-US" sz="1000" dirty="0">
+                <a:solidFill>
+                  <a:schemeClr val="accent1"/>
+                </a:solidFill>
+              </a:rPr>
+              <a:t>Water Heater Use Outlet Node</a:t>
+            </a:r>
+          </a:p>
+        </p:txBody>
+      </p:sp>
+      <p:cxnSp>
+        <p:nvCxnSpPr>
+          <p:cNvPr id="30" name="Straight Connector 29">
+            <a:extLst>
+              <a:ext uri="{FF2B5EF4-FFF2-40B4-BE49-F238E27FC236}">
+                <a16:creationId xmlns:a16="http://schemas.microsoft.com/office/drawing/2014/main" id="{50E5E65C-E5C9-575E-D9D5-B65F6EC2AC82}"/>
+              </a:ext>
+            </a:extLst>
+          </p:cNvPr>
+          <p:cNvCxnSpPr>
+            <a:cxnSpLocks/>
+            <a:stCxn id="22" idx="3"/>
+            <a:endCxn id="33" idx="0"/>
+          </p:cNvCxnSpPr>
+          <p:nvPr/>
+        </p:nvCxnSpPr>
+        <p:spPr>
+          <a:xfrm>
+            <a:off x="6601573" y="1142584"/>
+            <a:ext cx="1225081" cy="14365"/>
+          </a:xfrm>
+          <a:prstGeom prst="line">
+            <a:avLst/>
+          </a:prstGeom>
+        </p:spPr>
+        <p:style>
+          <a:lnRef idx="1">
+            <a:schemeClr val="accent1"/>
+          </a:lnRef>
+          <a:fillRef idx="0">
+            <a:schemeClr val="accent1"/>
+          </a:fillRef>
+          <a:effectRef idx="0">
+            <a:schemeClr val="accent1"/>
+          </a:effectRef>
+          <a:fontRef idx="minor">
+            <a:schemeClr val="tx1"/>
+          </a:fontRef>
+        </p:style>
+      </p:cxnSp>
+      <p:sp>
+        <p:nvSpPr>
+          <p:cNvPr id="33" name="Flowchart: Manual Operation 32">
+            <a:extLst>
+              <a:ext uri="{FF2B5EF4-FFF2-40B4-BE49-F238E27FC236}">
+                <a16:creationId xmlns:a16="http://schemas.microsoft.com/office/drawing/2014/main" id="{B94099C1-53C7-BB2E-21EF-FC5A2EDBC544}"/>
+              </a:ext>
+            </a:extLst>
+          </p:cNvPr>
+          <p:cNvSpPr/>
+          <p:nvPr/>
+        </p:nvSpPr>
+        <p:spPr>
+          <a:xfrm rot="16200000" flipH="1">
+            <a:off x="7693289" y="890219"/>
+            <a:ext cx="800188" cy="533459"/>
+          </a:xfrm>
+          <a:prstGeom prst="flowChartManualOperation">
+            <a:avLst/>
+          </a:prstGeom>
+        </p:spPr>
+        <p:style>
+          <a:lnRef idx="2">
+            <a:schemeClr val="accent2">
+              <a:shade val="50000"/>
+            </a:schemeClr>
+          </a:lnRef>
+          <a:fillRef idx="1">
+            <a:schemeClr val="accent2"/>
+          </a:fillRef>
+          <a:effectRef idx="0">
+            <a:schemeClr val="accent2"/>
+          </a:effectRef>
+          <a:fontRef idx="minor">
+            <a:schemeClr val="lt1"/>
+          </a:fontRef>
+        </p:style>
+        <p:txBody>
+          <a:bodyPr rtlCol="0" anchor="ctr"/>
+          <a:lstStyle/>
+          <a:p>
+            <a:pPr algn="ctr"/>
+            <a:endParaRPr lang="en-US"/>
+          </a:p>
+        </p:txBody>
+      </p:sp>
+      <p:cxnSp>
+        <p:nvCxnSpPr>
+          <p:cNvPr id="35" name="Straight Connector 34">
+            <a:extLst>
+              <a:ext uri="{FF2B5EF4-FFF2-40B4-BE49-F238E27FC236}">
+                <a16:creationId xmlns:a16="http://schemas.microsoft.com/office/drawing/2014/main" id="{17C316B3-0A58-8BE8-35BC-EEEFB1869C30}"/>
+              </a:ext>
+            </a:extLst>
+          </p:cNvPr>
+          <p:cNvCxnSpPr>
+            <a:cxnSpLocks/>
+            <a:stCxn id="33" idx="2"/>
+            <a:endCxn id="40" idx="1"/>
+          </p:cNvCxnSpPr>
+          <p:nvPr/>
+        </p:nvCxnSpPr>
+        <p:spPr>
+          <a:xfrm flipV="1">
+            <a:off x="8360113" y="1142584"/>
+            <a:ext cx="1079334" cy="14365"/>
+          </a:xfrm>
+          <a:prstGeom prst="line">
+            <a:avLst/>
+          </a:prstGeom>
+        </p:spPr>
+        <p:style>
+          <a:lnRef idx="1">
+            <a:schemeClr val="accent1"/>
+          </a:lnRef>
+          <a:fillRef idx="0">
+            <a:schemeClr val="accent1"/>
+          </a:fillRef>
+          <a:effectRef idx="0">
+            <a:schemeClr val="accent1"/>
+          </a:effectRef>
+          <a:fontRef idx="minor">
+            <a:schemeClr val="tx1"/>
+          </a:fontRef>
+        </p:style>
+      </p:cxnSp>
+      <p:sp>
+        <p:nvSpPr>
+          <p:cNvPr id="40" name="Rectangle 39">
+            <a:extLst>
+              <a:ext uri="{FF2B5EF4-FFF2-40B4-BE49-F238E27FC236}">
+                <a16:creationId xmlns:a16="http://schemas.microsoft.com/office/drawing/2014/main" id="{33D38330-DA50-6F62-D2A7-1EE84EC85DF7}"/>
+              </a:ext>
+            </a:extLst>
+          </p:cNvPr>
+          <p:cNvSpPr/>
+          <p:nvPr/>
+        </p:nvSpPr>
+        <p:spPr>
+          <a:xfrm>
+            <a:off x="9439447" y="842402"/>
+            <a:ext cx="720436" cy="600364"/>
+          </a:xfrm>
+          <a:prstGeom prst="rect">
+            <a:avLst/>
+          </a:prstGeom>
+          <a:solidFill>
+            <a:schemeClr val="bg1">
+              <a:lumMod val="65000"/>
+            </a:schemeClr>
+          </a:solidFill>
+        </p:spPr>
+        <p:style>
+          <a:lnRef idx="2">
+            <a:schemeClr val="accent1">
+              <a:shade val="50000"/>
+            </a:schemeClr>
+          </a:lnRef>
+          <a:fillRef idx="1">
+            <a:schemeClr val="accent1"/>
+          </a:fillRef>
+          <a:effectRef idx="0">
+            <a:schemeClr val="accent1"/>
+          </a:effectRef>
+          <a:fontRef idx="minor">
+            <a:schemeClr val="lt1"/>
+          </a:fontRef>
+        </p:style>
+        <p:txBody>
+          <a:bodyPr rtlCol="0" anchor="ctr"/>
+          <a:lstStyle/>
+          <a:p>
+            <a:pPr algn="ctr"/>
+            <a:r>
+              <a:rPr lang="en-US" sz="1000" b="1" dirty="0">
+                <a:solidFill>
+                  <a:schemeClr val="tx1"/>
+                </a:solidFill>
+              </a:rPr>
+              <a:t>DHW Supply Outlet Pipe</a:t>
+            </a:r>
+          </a:p>
+        </p:txBody>
+      </p:sp>
+      <p:sp>
+        <p:nvSpPr>
+          <p:cNvPr id="42" name="Oval 41">
+            <a:extLst>
+              <a:ext uri="{FF2B5EF4-FFF2-40B4-BE49-F238E27FC236}">
+                <a16:creationId xmlns:a16="http://schemas.microsoft.com/office/drawing/2014/main" id="{9DEF0E90-5BC6-9639-BC77-D0B6D1EDB038}"/>
+              </a:ext>
+            </a:extLst>
+          </p:cNvPr>
+          <p:cNvSpPr/>
+          <p:nvPr/>
+        </p:nvSpPr>
+        <p:spPr>
+          <a:xfrm>
+            <a:off x="8826216" y="1085506"/>
+            <a:ext cx="133165" cy="114156"/>
+          </a:xfrm>
+          <a:prstGeom prst="ellipse">
+            <a:avLst/>
+          </a:prstGeom>
+        </p:spPr>
+        <p:style>
+          <a:lnRef idx="2">
+            <a:schemeClr val="accent1">
+              <a:shade val="50000"/>
+            </a:schemeClr>
+          </a:lnRef>
+          <a:fillRef idx="1">
+            <a:schemeClr val="accent1"/>
+          </a:fillRef>
+          <a:effectRef idx="0">
+            <a:schemeClr val="accent1"/>
+          </a:effectRef>
+          <a:fontRef idx="minor">
+            <a:schemeClr val="lt1"/>
+          </a:fontRef>
+        </p:style>
+        <p:txBody>
+          <a:bodyPr rtlCol="0" anchor="ctr"/>
+          <a:lstStyle/>
+          <a:p>
+            <a:pPr algn="ctr"/>
+            <a:endParaRPr lang="en-US"/>
+          </a:p>
+        </p:txBody>
+      </p:sp>
+      <p:sp>
+        <p:nvSpPr>
+          <p:cNvPr id="43" name="Oval 42">
+            <a:extLst>
+              <a:ext uri="{FF2B5EF4-FFF2-40B4-BE49-F238E27FC236}">
+                <a16:creationId xmlns:a16="http://schemas.microsoft.com/office/drawing/2014/main" id="{4D227895-F037-8F5C-B605-E5EC3EDA967A}"/>
+              </a:ext>
+            </a:extLst>
+          </p:cNvPr>
+          <p:cNvSpPr/>
+          <p:nvPr/>
+        </p:nvSpPr>
+        <p:spPr>
+          <a:xfrm>
+            <a:off x="10838745" y="1094104"/>
+            <a:ext cx="133165" cy="114156"/>
+          </a:xfrm>
+          <a:prstGeom prst="ellipse">
+            <a:avLst/>
+          </a:prstGeom>
+        </p:spPr>
+        <p:style>
+          <a:lnRef idx="2">
+            <a:schemeClr val="accent1">
+              <a:shade val="50000"/>
+            </a:schemeClr>
+          </a:lnRef>
+          <a:fillRef idx="1">
+            <a:schemeClr val="accent1"/>
+          </a:fillRef>
+          <a:effectRef idx="0">
+            <a:schemeClr val="accent1"/>
+          </a:effectRef>
+          <a:fontRef idx="minor">
+            <a:schemeClr val="lt1"/>
+          </a:fontRef>
+        </p:style>
+        <p:txBody>
+          <a:bodyPr rtlCol="0" anchor="ctr"/>
+          <a:lstStyle/>
+          <a:p>
+            <a:pPr algn="ctr"/>
+            <a:endParaRPr lang="en-US"/>
+          </a:p>
+        </p:txBody>
+      </p:sp>
+      <p:cxnSp>
+        <p:nvCxnSpPr>
+          <p:cNvPr id="47" name="Straight Connector 46">
+            <a:extLst>
+              <a:ext uri="{FF2B5EF4-FFF2-40B4-BE49-F238E27FC236}">
+                <a16:creationId xmlns:a16="http://schemas.microsoft.com/office/drawing/2014/main" id="{6DD415F4-2459-B8E4-B8B9-9C6DF02A046F}"/>
+              </a:ext>
+            </a:extLst>
+          </p:cNvPr>
+          <p:cNvCxnSpPr>
+            <a:cxnSpLocks/>
+            <a:stCxn id="40" idx="3"/>
+          </p:cNvCxnSpPr>
+          <p:nvPr/>
+        </p:nvCxnSpPr>
+        <p:spPr>
+          <a:xfrm>
+            <a:off x="10159883" y="1142584"/>
+            <a:ext cx="1633049" cy="8598"/>
+          </a:xfrm>
+          <a:prstGeom prst="line">
+            <a:avLst/>
+          </a:prstGeom>
+        </p:spPr>
+        <p:style>
+          <a:lnRef idx="1">
+            <a:schemeClr val="accent1"/>
+          </a:lnRef>
+          <a:fillRef idx="0">
+            <a:schemeClr val="accent1"/>
+          </a:fillRef>
+          <a:effectRef idx="0">
+            <a:schemeClr val="accent1"/>
+          </a:effectRef>
+          <a:fontRef idx="minor">
+            <a:schemeClr val="tx1"/>
+          </a:fontRef>
+        </p:style>
+      </p:cxnSp>
+      <p:cxnSp>
+        <p:nvCxnSpPr>
+          <p:cNvPr id="50" name="Straight Connector 49">
+            <a:extLst>
+              <a:ext uri="{FF2B5EF4-FFF2-40B4-BE49-F238E27FC236}">
+                <a16:creationId xmlns:a16="http://schemas.microsoft.com/office/drawing/2014/main" id="{4B3B598D-656B-16EA-2B40-027496A0547F}"/>
+              </a:ext>
+            </a:extLst>
+          </p:cNvPr>
+          <p:cNvCxnSpPr>
+            <a:cxnSpLocks/>
+          </p:cNvCxnSpPr>
+          <p:nvPr/>
+        </p:nvCxnSpPr>
+        <p:spPr>
+          <a:xfrm>
+            <a:off x="11792932" y="1151182"/>
+            <a:ext cx="23746" cy="3194923"/>
+          </a:xfrm>
+          <a:prstGeom prst="line">
+            <a:avLst/>
+          </a:prstGeom>
+        </p:spPr>
+        <p:style>
+          <a:lnRef idx="1">
+            <a:schemeClr val="accent1"/>
+          </a:lnRef>
+          <a:fillRef idx="0">
+            <a:schemeClr val="accent1"/>
+          </a:fillRef>
+          <a:effectRef idx="0">
+            <a:schemeClr val="accent1"/>
+          </a:effectRef>
+          <a:fontRef idx="minor">
+            <a:schemeClr val="tx1"/>
+          </a:fontRef>
+        </p:style>
+      </p:cxnSp>
+      <p:cxnSp>
+        <p:nvCxnSpPr>
+          <p:cNvPr id="53" name="Straight Connector 52">
+            <a:extLst>
+              <a:ext uri="{FF2B5EF4-FFF2-40B4-BE49-F238E27FC236}">
+                <a16:creationId xmlns:a16="http://schemas.microsoft.com/office/drawing/2014/main" id="{F3154954-1821-E56A-44BE-5F6D88C4D451}"/>
+              </a:ext>
+            </a:extLst>
+          </p:cNvPr>
+          <p:cNvCxnSpPr>
+            <a:cxnSpLocks/>
+            <a:endCxn id="76" idx="3"/>
+          </p:cNvCxnSpPr>
+          <p:nvPr/>
+        </p:nvCxnSpPr>
+        <p:spPr>
+          <a:xfrm flipH="1" flipV="1">
+            <a:off x="10291861" y="4335331"/>
+            <a:ext cx="1524817" cy="19713"/>
+          </a:xfrm>
+          <a:prstGeom prst="line">
+            <a:avLst/>
+          </a:prstGeom>
+        </p:spPr>
+        <p:style>
+          <a:lnRef idx="1">
+            <a:schemeClr val="accent1"/>
+          </a:lnRef>
+          <a:fillRef idx="0">
+            <a:schemeClr val="accent1"/>
+          </a:fillRef>
+          <a:effectRef idx="0">
+            <a:schemeClr val="accent1"/>
+          </a:effectRef>
+          <a:fontRef idx="minor">
+            <a:schemeClr val="tx1"/>
+          </a:fontRef>
+        </p:style>
+      </p:cxnSp>
+      <p:sp>
+        <p:nvSpPr>
+          <p:cNvPr id="58" name="TextBox 57">
+            <a:extLst>
+              <a:ext uri="{FF2B5EF4-FFF2-40B4-BE49-F238E27FC236}">
+                <a16:creationId xmlns:a16="http://schemas.microsoft.com/office/drawing/2014/main" id="{6B17473E-EF99-44D0-760E-B6C390FEA231}"/>
+              </a:ext>
+            </a:extLst>
+          </p:cNvPr>
+          <p:cNvSpPr txBox="1"/>
+          <p:nvPr/>
+        </p:nvSpPr>
+        <p:spPr>
+          <a:xfrm>
+            <a:off x="10406491" y="1156948"/>
+            <a:ext cx="938073" cy="400110"/>
+          </a:xfrm>
+          <a:prstGeom prst="rect">
+            <a:avLst/>
+          </a:prstGeom>
+          <a:noFill/>
+        </p:spPr>
+        <p:txBody>
+          <a:bodyPr wrap="square" rtlCol="0">
+            <a:spAutoFit/>
+          </a:bodyPr>
+          <a:lstStyle/>
+          <a:p>
+            <a:pPr algn="ctr"/>
+            <a:r>
+              <a:rPr lang="en-US" sz="1000" dirty="0">
+                <a:solidFill>
+                  <a:schemeClr val="accent1"/>
+                </a:solidFill>
+              </a:rPr>
+              <a:t>DHW Supply Outlet Node</a:t>
+            </a:r>
+          </a:p>
+        </p:txBody>
+      </p:sp>
+      <p:sp>
+        <p:nvSpPr>
+          <p:cNvPr id="61" name="Rectangle 60">
+            <a:extLst>
+              <a:ext uri="{FF2B5EF4-FFF2-40B4-BE49-F238E27FC236}">
+                <a16:creationId xmlns:a16="http://schemas.microsoft.com/office/drawing/2014/main" id="{C36ECCC1-2320-A9E9-7553-5EBCA05FD99A}"/>
+              </a:ext>
+            </a:extLst>
+          </p:cNvPr>
+          <p:cNvSpPr/>
+          <p:nvPr/>
+        </p:nvSpPr>
+        <p:spPr>
+          <a:xfrm>
+            <a:off x="1219269" y="452283"/>
+            <a:ext cx="2764224" cy="1204568"/>
+          </a:xfrm>
+          <a:prstGeom prst="rect">
+            <a:avLst/>
+          </a:prstGeom>
+          <a:noFill/>
+          <a:ln>
+            <a:prstDash val="sysDash"/>
+          </a:ln>
+        </p:spPr>
+        <p:style>
+          <a:lnRef idx="2">
+            <a:schemeClr val="accent1">
+              <a:shade val="50000"/>
+            </a:schemeClr>
+          </a:lnRef>
+          <a:fillRef idx="1">
+            <a:schemeClr val="accent1"/>
+          </a:fillRef>
+          <a:effectRef idx="0">
+            <a:schemeClr val="accent1"/>
+          </a:effectRef>
+          <a:fontRef idx="minor">
+            <a:schemeClr val="lt1"/>
+          </a:fontRef>
+        </p:style>
+        <p:txBody>
+          <a:bodyPr rtlCol="0" anchor="ctr"/>
+          <a:lstStyle/>
+          <a:p>
+            <a:pPr algn="ctr"/>
+            <a:endParaRPr lang="en-US"/>
+          </a:p>
+        </p:txBody>
+      </p:sp>
+      <p:sp>
+        <p:nvSpPr>
+          <p:cNvPr id="62" name="Rectangle 61">
+            <a:extLst>
+              <a:ext uri="{FF2B5EF4-FFF2-40B4-BE49-F238E27FC236}">
+                <a16:creationId xmlns:a16="http://schemas.microsoft.com/office/drawing/2014/main" id="{81D8FF94-FCAD-D813-CA7F-64EE077FC372}"/>
+              </a:ext>
+            </a:extLst>
+          </p:cNvPr>
+          <p:cNvSpPr/>
+          <p:nvPr/>
+        </p:nvSpPr>
+        <p:spPr>
+          <a:xfrm>
+            <a:off x="4986001" y="452283"/>
+            <a:ext cx="2619077" cy="1204567"/>
+          </a:xfrm>
+          <a:prstGeom prst="rect">
+            <a:avLst/>
+          </a:prstGeom>
+          <a:noFill/>
+          <a:ln>
+            <a:prstDash val="sysDash"/>
+          </a:ln>
+        </p:spPr>
+        <p:style>
+          <a:lnRef idx="2">
+            <a:schemeClr val="accent1">
+              <a:shade val="50000"/>
+            </a:schemeClr>
+          </a:lnRef>
+          <a:fillRef idx="1">
+            <a:schemeClr val="accent1"/>
+          </a:fillRef>
+          <a:effectRef idx="0">
+            <a:schemeClr val="accent1"/>
+          </a:effectRef>
+          <a:fontRef idx="minor">
+            <a:schemeClr val="lt1"/>
+          </a:fontRef>
+        </p:style>
+        <p:txBody>
+          <a:bodyPr rtlCol="0" anchor="ctr"/>
+          <a:lstStyle/>
+          <a:p>
+            <a:pPr algn="ctr"/>
+            <a:endParaRPr lang="en-US"/>
+          </a:p>
+        </p:txBody>
+      </p:sp>
+      <p:sp>
+        <p:nvSpPr>
+          <p:cNvPr id="63" name="Rectangle 62">
+            <a:extLst>
+              <a:ext uri="{FF2B5EF4-FFF2-40B4-BE49-F238E27FC236}">
+                <a16:creationId xmlns:a16="http://schemas.microsoft.com/office/drawing/2014/main" id="{64EAC5FE-AF42-E985-723C-B12530929E15}"/>
+              </a:ext>
+            </a:extLst>
+          </p:cNvPr>
+          <p:cNvSpPr/>
+          <p:nvPr/>
+        </p:nvSpPr>
+        <p:spPr>
+          <a:xfrm>
+            <a:off x="8558144" y="440989"/>
+            <a:ext cx="2619077" cy="1215861"/>
+          </a:xfrm>
+          <a:prstGeom prst="rect">
+            <a:avLst/>
+          </a:prstGeom>
+          <a:noFill/>
+          <a:ln>
+            <a:prstDash val="sysDash"/>
+          </a:ln>
+        </p:spPr>
+        <p:style>
+          <a:lnRef idx="2">
+            <a:schemeClr val="accent1">
+              <a:shade val="50000"/>
+            </a:schemeClr>
+          </a:lnRef>
+          <a:fillRef idx="1">
+            <a:schemeClr val="accent1"/>
+          </a:fillRef>
+          <a:effectRef idx="0">
+            <a:schemeClr val="accent1"/>
+          </a:effectRef>
+          <a:fontRef idx="minor">
+            <a:schemeClr val="lt1"/>
+          </a:fontRef>
+        </p:style>
+        <p:txBody>
+          <a:bodyPr rtlCol="0" anchor="ctr"/>
+          <a:lstStyle/>
+          <a:p>
+            <a:pPr algn="ctr"/>
+            <a:endParaRPr lang="en-US"/>
+          </a:p>
+        </p:txBody>
+      </p:sp>
+      <p:sp>
+        <p:nvSpPr>
+          <p:cNvPr id="10" name="TextBox 9">
+            <a:extLst>
+              <a:ext uri="{FF2B5EF4-FFF2-40B4-BE49-F238E27FC236}">
+                <a16:creationId xmlns:a16="http://schemas.microsoft.com/office/drawing/2014/main" id="{512C5170-BED9-7EB0-2E26-7593FBB2A21A}"/>
+              </a:ext>
+            </a:extLst>
+          </p:cNvPr>
+          <p:cNvSpPr txBox="1"/>
+          <p:nvPr/>
+        </p:nvSpPr>
+        <p:spPr>
+          <a:xfrm>
+            <a:off x="1968625" y="369194"/>
+            <a:ext cx="1491784" cy="276999"/>
+          </a:xfrm>
+          <a:prstGeom prst="rect">
+            <a:avLst/>
+          </a:prstGeom>
+          <a:solidFill>
+            <a:schemeClr val="bg1"/>
+          </a:solidFill>
+        </p:spPr>
+        <p:txBody>
+          <a:bodyPr wrap="square" rtlCol="0">
+            <a:spAutoFit/>
+          </a:bodyPr>
+          <a:lstStyle/>
+          <a:p>
+            <a:pPr algn="ctr"/>
+            <a:r>
+              <a:rPr lang="en-US" sz="1200" b="1" dirty="0">
+                <a:solidFill>
+                  <a:schemeClr val="accent1"/>
+                </a:solidFill>
+              </a:rPr>
+              <a:t>Mains Inlet Branch</a:t>
+            </a:r>
+          </a:p>
+        </p:txBody>
+      </p:sp>
+      <p:sp>
+        <p:nvSpPr>
+          <p:cNvPr id="24" name="TextBox 23">
+            <a:extLst>
+              <a:ext uri="{FF2B5EF4-FFF2-40B4-BE49-F238E27FC236}">
+                <a16:creationId xmlns:a16="http://schemas.microsoft.com/office/drawing/2014/main" id="{1495C864-8C38-5020-F65A-0642AB8EA291}"/>
+              </a:ext>
+            </a:extLst>
+          </p:cNvPr>
+          <p:cNvSpPr txBox="1"/>
+          <p:nvPr/>
+        </p:nvSpPr>
+        <p:spPr>
+          <a:xfrm>
+            <a:off x="5494341" y="386332"/>
+            <a:ext cx="1576268" cy="276999"/>
+          </a:xfrm>
+          <a:prstGeom prst="rect">
+            <a:avLst/>
+          </a:prstGeom>
+          <a:solidFill>
+            <a:schemeClr val="bg1"/>
+          </a:solidFill>
+        </p:spPr>
+        <p:txBody>
+          <a:bodyPr wrap="square" rtlCol="0">
+            <a:spAutoFit/>
+          </a:bodyPr>
+          <a:lstStyle/>
+          <a:p>
+            <a:pPr algn="ctr"/>
+            <a:r>
+              <a:rPr lang="en-US" sz="1200" b="1" dirty="0">
+                <a:solidFill>
+                  <a:schemeClr val="accent1"/>
+                </a:solidFill>
+              </a:rPr>
+              <a:t>Water Heater Branch</a:t>
+            </a:r>
+          </a:p>
+        </p:txBody>
+      </p:sp>
+      <p:sp>
+        <p:nvSpPr>
+          <p:cNvPr id="41" name="TextBox 40">
+            <a:extLst>
+              <a:ext uri="{FF2B5EF4-FFF2-40B4-BE49-F238E27FC236}">
+                <a16:creationId xmlns:a16="http://schemas.microsoft.com/office/drawing/2014/main" id="{80905FF7-5E89-F2D9-E064-8AF9B04F64CC}"/>
+              </a:ext>
+            </a:extLst>
+          </p:cNvPr>
+          <p:cNvSpPr txBox="1"/>
+          <p:nvPr/>
+        </p:nvSpPr>
+        <p:spPr>
+          <a:xfrm>
+            <a:off x="9205365" y="318116"/>
+            <a:ext cx="1199416" cy="461665"/>
+          </a:xfrm>
+          <a:prstGeom prst="rect">
+            <a:avLst/>
+          </a:prstGeom>
+          <a:solidFill>
+            <a:schemeClr val="bg1"/>
+          </a:solidFill>
+        </p:spPr>
+        <p:txBody>
+          <a:bodyPr wrap="square" rtlCol="0">
+            <a:spAutoFit/>
+          </a:bodyPr>
+          <a:lstStyle/>
+          <a:p>
+            <a:pPr algn="ctr"/>
+            <a:r>
+              <a:rPr lang="en-US" sz="1200" b="1" dirty="0">
+                <a:solidFill>
+                  <a:schemeClr val="accent1"/>
+                </a:solidFill>
+              </a:rPr>
+              <a:t>DHW Supply Outlet Branch</a:t>
+            </a:r>
+          </a:p>
+        </p:txBody>
+      </p:sp>
+      <p:sp>
+        <p:nvSpPr>
+          <p:cNvPr id="21" name="TextBox 20">
+            <a:extLst>
+              <a:ext uri="{FF2B5EF4-FFF2-40B4-BE49-F238E27FC236}">
+                <a16:creationId xmlns:a16="http://schemas.microsoft.com/office/drawing/2014/main" id="{9FDCF25B-6F26-5E50-A44E-8937116387B3}"/>
+              </a:ext>
+            </a:extLst>
+          </p:cNvPr>
+          <p:cNvSpPr txBox="1"/>
+          <p:nvPr/>
+        </p:nvSpPr>
+        <p:spPr>
+          <a:xfrm>
+            <a:off x="3839692" y="412261"/>
+            <a:ext cx="1576268" cy="276999"/>
+          </a:xfrm>
+          <a:prstGeom prst="rect">
+            <a:avLst/>
+          </a:prstGeom>
+          <a:solidFill>
+            <a:schemeClr val="bg1"/>
+          </a:solidFill>
+        </p:spPr>
+        <p:txBody>
+          <a:bodyPr wrap="square" rtlCol="0">
+            <a:spAutoFit/>
+          </a:bodyPr>
+          <a:lstStyle/>
+          <a:p>
+            <a:pPr algn="ctr"/>
+            <a:r>
+              <a:rPr lang="en-US" sz="1200" b="1" dirty="0">
+                <a:solidFill>
+                  <a:schemeClr val="accent2"/>
+                </a:solidFill>
+              </a:rPr>
+              <a:t>DHW Supply Splitter</a:t>
+            </a:r>
+          </a:p>
+        </p:txBody>
+      </p:sp>
+      <p:sp>
+        <p:nvSpPr>
+          <p:cNvPr id="46" name="TextBox 45">
+            <a:extLst>
+              <a:ext uri="{FF2B5EF4-FFF2-40B4-BE49-F238E27FC236}">
+                <a16:creationId xmlns:a16="http://schemas.microsoft.com/office/drawing/2014/main" id="{CB3833A1-3BE8-33C7-5DEE-A699F196A1FE}"/>
+              </a:ext>
+            </a:extLst>
+          </p:cNvPr>
+          <p:cNvSpPr txBox="1"/>
+          <p:nvPr/>
+        </p:nvSpPr>
+        <p:spPr>
+          <a:xfrm>
+            <a:off x="7280915" y="441795"/>
+            <a:ext cx="1757779" cy="276999"/>
+          </a:xfrm>
+          <a:prstGeom prst="rect">
+            <a:avLst/>
+          </a:prstGeom>
+          <a:solidFill>
+            <a:schemeClr val="bg1"/>
+          </a:solidFill>
+        </p:spPr>
+        <p:txBody>
+          <a:bodyPr wrap="square" rtlCol="0">
+            <a:spAutoFit/>
+          </a:bodyPr>
+          <a:lstStyle/>
+          <a:p>
+            <a:pPr algn="ctr"/>
+            <a:r>
+              <a:rPr lang="en-US" sz="1200" b="1" dirty="0">
+                <a:solidFill>
+                  <a:schemeClr val="accent2">
+                    <a:lumMod val="75000"/>
+                  </a:schemeClr>
+                </a:solidFill>
+              </a:rPr>
+              <a:t>DHW Supply Mixer</a:t>
+            </a:r>
+          </a:p>
+        </p:txBody>
+      </p:sp>
+      <p:sp>
+        <p:nvSpPr>
+          <p:cNvPr id="69" name="Rectangle 68">
+            <a:extLst>
+              <a:ext uri="{FF2B5EF4-FFF2-40B4-BE49-F238E27FC236}">
+                <a16:creationId xmlns:a16="http://schemas.microsoft.com/office/drawing/2014/main" id="{ECA8BBFE-29EF-08C8-1E15-99AB05C3965A}"/>
+              </a:ext>
+            </a:extLst>
+          </p:cNvPr>
+          <p:cNvSpPr/>
+          <p:nvPr/>
+        </p:nvSpPr>
+        <p:spPr>
+          <a:xfrm>
+            <a:off x="1693756" y="226240"/>
+            <a:ext cx="9074812" cy="1609765"/>
+          </a:xfrm>
+          <a:prstGeom prst="rect">
+            <a:avLst/>
+          </a:prstGeom>
+          <a:noFill/>
+          <a:ln w="19050">
+            <a:solidFill>
+              <a:schemeClr val="accent6"/>
+            </a:solidFill>
+            <a:prstDash val="sysDash"/>
+          </a:ln>
+        </p:spPr>
+        <p:style>
+          <a:lnRef idx="2">
+            <a:schemeClr val="accent1">
+              <a:shade val="50000"/>
+            </a:schemeClr>
+          </a:lnRef>
+          <a:fillRef idx="1">
+            <a:schemeClr val="accent1"/>
+          </a:fillRef>
+          <a:effectRef idx="0">
+            <a:schemeClr val="accent1"/>
+          </a:effectRef>
+          <a:fontRef idx="minor">
+            <a:schemeClr val="lt1"/>
+          </a:fontRef>
+        </p:style>
+        <p:txBody>
+          <a:bodyPr rtlCol="0" anchor="ctr"/>
+          <a:lstStyle/>
+          <a:p>
+            <a:pPr algn="ctr"/>
+            <a:endParaRPr lang="en-US"/>
+          </a:p>
+        </p:txBody>
+      </p:sp>
+      <p:sp>
+        <p:nvSpPr>
+          <p:cNvPr id="70" name="TextBox 69">
+            <a:extLst>
+              <a:ext uri="{FF2B5EF4-FFF2-40B4-BE49-F238E27FC236}">
+                <a16:creationId xmlns:a16="http://schemas.microsoft.com/office/drawing/2014/main" id="{48A6299A-F2D9-F9AA-051B-1B5A9AABCA7D}"/>
+              </a:ext>
+            </a:extLst>
+          </p:cNvPr>
+          <p:cNvSpPr txBox="1"/>
+          <p:nvPr/>
+        </p:nvSpPr>
+        <p:spPr>
+          <a:xfrm>
+            <a:off x="5401071" y="59747"/>
+            <a:ext cx="1957870" cy="307777"/>
+          </a:xfrm>
+          <a:prstGeom prst="rect">
+            <a:avLst/>
+          </a:prstGeom>
+          <a:solidFill>
+            <a:schemeClr val="bg1"/>
+          </a:solidFill>
+        </p:spPr>
+        <p:txBody>
+          <a:bodyPr wrap="square" rtlCol="0">
+            <a:spAutoFit/>
+          </a:bodyPr>
+          <a:lstStyle/>
+          <a:p>
+            <a:pPr algn="ctr"/>
+            <a:r>
+              <a:rPr lang="en-US" sz="1400" b="1" dirty="0">
+                <a:solidFill>
+                  <a:schemeClr val="accent6">
+                    <a:lumMod val="75000"/>
+                  </a:schemeClr>
+                </a:solidFill>
+              </a:rPr>
+              <a:t>Plant/Supply Side</a:t>
+            </a:r>
+            <a:endParaRPr lang="en-US" sz="1400" dirty="0">
+              <a:solidFill>
+                <a:schemeClr val="accent6">
+                  <a:lumMod val="75000"/>
+                </a:schemeClr>
+              </a:solidFill>
+            </a:endParaRPr>
+          </a:p>
+        </p:txBody>
+      </p:sp>
+      <p:sp>
+        <p:nvSpPr>
+          <p:cNvPr id="72" name="Oval 71">
+            <a:extLst>
+              <a:ext uri="{FF2B5EF4-FFF2-40B4-BE49-F238E27FC236}">
+                <a16:creationId xmlns:a16="http://schemas.microsoft.com/office/drawing/2014/main" id="{6B497410-F426-AEE4-02D5-42044891CEE4}"/>
+              </a:ext>
+            </a:extLst>
+          </p:cNvPr>
+          <p:cNvSpPr/>
+          <p:nvPr/>
+        </p:nvSpPr>
+        <p:spPr>
+          <a:xfrm>
+            <a:off x="10812551" y="4287192"/>
+            <a:ext cx="133165" cy="114156"/>
+          </a:xfrm>
+          <a:prstGeom prst="ellipse">
+            <a:avLst/>
+          </a:prstGeom>
+        </p:spPr>
+        <p:style>
+          <a:lnRef idx="2">
+            <a:schemeClr val="accent1">
+              <a:shade val="50000"/>
+            </a:schemeClr>
+          </a:lnRef>
+          <a:fillRef idx="1">
+            <a:schemeClr val="accent1"/>
+          </a:fillRef>
+          <a:effectRef idx="0">
+            <a:schemeClr val="accent1"/>
+          </a:effectRef>
+          <a:fontRef idx="minor">
+            <a:schemeClr val="lt1"/>
+          </a:fontRef>
+        </p:style>
+        <p:txBody>
+          <a:bodyPr rtlCol="0" anchor="ctr"/>
+          <a:lstStyle/>
+          <a:p>
+            <a:pPr algn="ctr"/>
+            <a:endParaRPr lang="en-US"/>
+          </a:p>
+        </p:txBody>
+      </p:sp>
+      <p:sp>
+        <p:nvSpPr>
+          <p:cNvPr id="73" name="TextBox 72">
+            <a:extLst>
+              <a:ext uri="{FF2B5EF4-FFF2-40B4-BE49-F238E27FC236}">
+                <a16:creationId xmlns:a16="http://schemas.microsoft.com/office/drawing/2014/main" id="{EE83998E-196D-6D04-35BB-805B9C03ABC3}"/>
+              </a:ext>
+            </a:extLst>
+          </p:cNvPr>
+          <p:cNvSpPr txBox="1"/>
+          <p:nvPr/>
+        </p:nvSpPr>
+        <p:spPr>
+          <a:xfrm>
+            <a:off x="10410098" y="4435458"/>
+            <a:ext cx="938073" cy="400110"/>
+          </a:xfrm>
+          <a:prstGeom prst="rect">
+            <a:avLst/>
+          </a:prstGeom>
+          <a:noFill/>
+        </p:spPr>
+        <p:txBody>
+          <a:bodyPr wrap="square" rtlCol="0">
+            <a:spAutoFit/>
+          </a:bodyPr>
+          <a:lstStyle/>
+          <a:p>
+            <a:pPr algn="ctr"/>
+            <a:r>
+              <a:rPr lang="en-US" sz="1000" dirty="0">
+                <a:solidFill>
+                  <a:schemeClr val="accent1"/>
+                </a:solidFill>
+              </a:rPr>
+              <a:t>DHW Demand Inlet Node</a:t>
+            </a:r>
+          </a:p>
+        </p:txBody>
+      </p:sp>
+      <p:cxnSp>
+        <p:nvCxnSpPr>
+          <p:cNvPr id="75" name="Straight Connector 74">
+            <a:extLst>
+              <a:ext uri="{FF2B5EF4-FFF2-40B4-BE49-F238E27FC236}">
+                <a16:creationId xmlns:a16="http://schemas.microsoft.com/office/drawing/2014/main" id="{26C5D7E7-D7A4-DD26-B7DF-7AE0A47E618E}"/>
+              </a:ext>
+            </a:extLst>
+          </p:cNvPr>
+          <p:cNvCxnSpPr>
+            <a:cxnSpLocks/>
+            <a:stCxn id="84" idx="2"/>
+            <a:endCxn id="76" idx="1"/>
+          </p:cNvCxnSpPr>
+          <p:nvPr/>
+        </p:nvCxnSpPr>
+        <p:spPr>
+          <a:xfrm>
+            <a:off x="8461760" y="4327580"/>
+            <a:ext cx="1109665" cy="7751"/>
+          </a:xfrm>
+          <a:prstGeom prst="line">
+            <a:avLst/>
+          </a:prstGeom>
+        </p:spPr>
+        <p:style>
+          <a:lnRef idx="1">
+            <a:schemeClr val="accent1"/>
+          </a:lnRef>
+          <a:fillRef idx="0">
+            <a:schemeClr val="accent1"/>
+          </a:fillRef>
+          <a:effectRef idx="0">
+            <a:schemeClr val="accent1"/>
+          </a:effectRef>
+          <a:fontRef idx="minor">
+            <a:schemeClr val="tx1"/>
+          </a:fontRef>
+        </p:style>
+      </p:cxnSp>
+      <p:sp>
+        <p:nvSpPr>
+          <p:cNvPr id="76" name="Rectangle 75">
+            <a:extLst>
+              <a:ext uri="{FF2B5EF4-FFF2-40B4-BE49-F238E27FC236}">
+                <a16:creationId xmlns:a16="http://schemas.microsoft.com/office/drawing/2014/main" id="{2117B5DF-7D6E-6DA5-476C-1766D2420024}"/>
+              </a:ext>
+            </a:extLst>
+          </p:cNvPr>
+          <p:cNvSpPr/>
+          <p:nvPr/>
+        </p:nvSpPr>
+        <p:spPr>
+          <a:xfrm>
+            <a:off x="9571425" y="4035149"/>
+            <a:ext cx="720436" cy="600364"/>
+          </a:xfrm>
+          <a:prstGeom prst="rect">
+            <a:avLst/>
+          </a:prstGeom>
+          <a:solidFill>
+            <a:schemeClr val="bg1">
+              <a:lumMod val="65000"/>
+            </a:schemeClr>
+          </a:solidFill>
+        </p:spPr>
+        <p:style>
+          <a:lnRef idx="2">
+            <a:schemeClr val="accent1">
+              <a:shade val="50000"/>
+            </a:schemeClr>
+          </a:lnRef>
+          <a:fillRef idx="1">
+            <a:schemeClr val="accent1"/>
+          </a:fillRef>
+          <a:effectRef idx="0">
+            <a:schemeClr val="accent1"/>
+          </a:effectRef>
+          <a:fontRef idx="minor">
+            <a:schemeClr val="lt1"/>
+          </a:fontRef>
+        </p:style>
+        <p:txBody>
+          <a:bodyPr rtlCol="0" anchor="ctr"/>
+          <a:lstStyle/>
+          <a:p>
+            <a:pPr algn="ctr"/>
+            <a:r>
+              <a:rPr lang="en-US" sz="1000" b="1" dirty="0">
+                <a:solidFill>
+                  <a:schemeClr val="tx1"/>
+                </a:solidFill>
+              </a:rPr>
+              <a:t>DHW Demand Inlet Pipe</a:t>
+            </a:r>
+          </a:p>
+        </p:txBody>
+      </p:sp>
+      <p:sp>
+        <p:nvSpPr>
+          <p:cNvPr id="77" name="Oval 76">
+            <a:extLst>
+              <a:ext uri="{FF2B5EF4-FFF2-40B4-BE49-F238E27FC236}">
+                <a16:creationId xmlns:a16="http://schemas.microsoft.com/office/drawing/2014/main" id="{5CE2BF44-3BFA-9846-591F-81E461E9535D}"/>
+              </a:ext>
+            </a:extLst>
+          </p:cNvPr>
+          <p:cNvSpPr/>
+          <p:nvPr/>
+        </p:nvSpPr>
+        <p:spPr>
+          <a:xfrm>
+            <a:off x="9037507" y="4270501"/>
+            <a:ext cx="133165" cy="114156"/>
+          </a:xfrm>
+          <a:prstGeom prst="ellipse">
+            <a:avLst/>
+          </a:prstGeom>
+        </p:spPr>
+        <p:style>
+          <a:lnRef idx="2">
+            <a:schemeClr val="accent1">
+              <a:shade val="50000"/>
+            </a:schemeClr>
+          </a:lnRef>
+          <a:fillRef idx="1">
+            <a:schemeClr val="accent1"/>
+          </a:fillRef>
+          <a:effectRef idx="0">
+            <a:schemeClr val="accent1"/>
+          </a:effectRef>
+          <a:fontRef idx="minor">
+            <a:schemeClr val="lt1"/>
+          </a:fontRef>
+        </p:style>
+        <p:txBody>
+          <a:bodyPr rtlCol="0" anchor="ctr"/>
+          <a:lstStyle/>
+          <a:p>
+            <a:pPr algn="ctr"/>
+            <a:endParaRPr lang="en-US"/>
+          </a:p>
+        </p:txBody>
+      </p:sp>
+      <p:sp>
+        <p:nvSpPr>
+          <p:cNvPr id="78" name="TextBox 77">
+            <a:extLst>
+              <a:ext uri="{FF2B5EF4-FFF2-40B4-BE49-F238E27FC236}">
+                <a16:creationId xmlns:a16="http://schemas.microsoft.com/office/drawing/2014/main" id="{B17F86C1-8E41-1680-BD6F-CED668BE8B97}"/>
+              </a:ext>
+            </a:extLst>
+          </p:cNvPr>
+          <p:cNvSpPr txBox="1"/>
+          <p:nvPr/>
+        </p:nvSpPr>
+        <p:spPr>
+          <a:xfrm>
+            <a:off x="8651150" y="4482120"/>
+            <a:ext cx="938073" cy="553998"/>
+          </a:xfrm>
+          <a:prstGeom prst="rect">
+            <a:avLst/>
+          </a:prstGeom>
+          <a:noFill/>
+        </p:spPr>
+        <p:txBody>
+          <a:bodyPr wrap="square" rtlCol="0">
+            <a:spAutoFit/>
+          </a:bodyPr>
+          <a:lstStyle/>
+          <a:p>
+            <a:pPr algn="ctr"/>
+            <a:r>
+              <a:rPr lang="en-US" sz="1000" dirty="0">
+                <a:solidFill>
+                  <a:schemeClr val="accent1"/>
+                </a:solidFill>
+              </a:rPr>
+              <a:t>DHW Demand Inlet Pipe Outlet Node</a:t>
+            </a:r>
+          </a:p>
+        </p:txBody>
+      </p:sp>
+      <p:sp>
+        <p:nvSpPr>
+          <p:cNvPr id="79" name="Rectangle 78">
+            <a:extLst>
+              <a:ext uri="{FF2B5EF4-FFF2-40B4-BE49-F238E27FC236}">
+                <a16:creationId xmlns:a16="http://schemas.microsoft.com/office/drawing/2014/main" id="{89FB4C7C-7B1F-D19E-3967-40BF03CDB6AA}"/>
+              </a:ext>
+            </a:extLst>
+          </p:cNvPr>
+          <p:cNvSpPr/>
+          <p:nvPr/>
+        </p:nvSpPr>
+        <p:spPr>
+          <a:xfrm>
+            <a:off x="8690122" y="3529259"/>
+            <a:ext cx="2619077" cy="1563936"/>
+          </a:xfrm>
+          <a:prstGeom prst="rect">
+            <a:avLst/>
+          </a:prstGeom>
+          <a:noFill/>
+          <a:ln>
+            <a:prstDash val="sysDash"/>
+          </a:ln>
+        </p:spPr>
+        <p:style>
+          <a:lnRef idx="2">
+            <a:schemeClr val="accent1">
+              <a:shade val="50000"/>
+            </a:schemeClr>
+          </a:lnRef>
+          <a:fillRef idx="1">
+            <a:schemeClr val="accent1"/>
+          </a:fillRef>
+          <a:effectRef idx="0">
+            <a:schemeClr val="accent1"/>
+          </a:effectRef>
+          <a:fontRef idx="minor">
+            <a:schemeClr val="lt1"/>
+          </a:fontRef>
+        </p:style>
+        <p:txBody>
+          <a:bodyPr rtlCol="0" anchor="ctr"/>
+          <a:lstStyle/>
+          <a:p>
+            <a:pPr algn="ctr"/>
+            <a:endParaRPr lang="en-US"/>
+          </a:p>
+        </p:txBody>
+      </p:sp>
+      <p:sp>
+        <p:nvSpPr>
+          <p:cNvPr id="80" name="TextBox 79">
+            <a:extLst>
+              <a:ext uri="{FF2B5EF4-FFF2-40B4-BE49-F238E27FC236}">
+                <a16:creationId xmlns:a16="http://schemas.microsoft.com/office/drawing/2014/main" id="{889399BB-4656-95BC-4708-DBC765E77A07}"/>
+              </a:ext>
+            </a:extLst>
+          </p:cNvPr>
+          <p:cNvSpPr txBox="1"/>
+          <p:nvPr/>
+        </p:nvSpPr>
+        <p:spPr>
+          <a:xfrm>
+            <a:off x="9337343" y="3292588"/>
+            <a:ext cx="1199416" cy="461665"/>
+          </a:xfrm>
+          <a:prstGeom prst="rect">
+            <a:avLst/>
+          </a:prstGeom>
+          <a:solidFill>
+            <a:schemeClr val="bg1"/>
+          </a:solidFill>
+        </p:spPr>
+        <p:txBody>
+          <a:bodyPr wrap="square" rtlCol="0">
+            <a:spAutoFit/>
+          </a:bodyPr>
+          <a:lstStyle/>
+          <a:p>
+            <a:pPr algn="ctr"/>
+            <a:r>
+              <a:rPr lang="en-US" sz="1200" b="1" dirty="0">
+                <a:solidFill>
+                  <a:schemeClr val="accent1"/>
+                </a:solidFill>
+              </a:rPr>
+              <a:t>DHW Demand Inlet Branch</a:t>
+            </a:r>
+          </a:p>
+        </p:txBody>
+      </p:sp>
+      <p:sp>
+        <p:nvSpPr>
+          <p:cNvPr id="84" name="Flowchart: Manual Operation 83">
+            <a:extLst>
+              <a:ext uri="{FF2B5EF4-FFF2-40B4-BE49-F238E27FC236}">
+                <a16:creationId xmlns:a16="http://schemas.microsoft.com/office/drawing/2014/main" id="{BF2504B7-3A4C-7742-C32E-1DBD290590ED}"/>
+              </a:ext>
+            </a:extLst>
+          </p:cNvPr>
+          <p:cNvSpPr/>
+          <p:nvPr/>
+        </p:nvSpPr>
+        <p:spPr>
+          <a:xfrm rot="16200000" flipH="1">
+            <a:off x="7794936" y="4060850"/>
+            <a:ext cx="800188" cy="533459"/>
+          </a:xfrm>
+          <a:prstGeom prst="flowChartManualOperation">
+            <a:avLst/>
+          </a:prstGeom>
+          <a:solidFill>
+            <a:schemeClr val="accent2">
+              <a:lumMod val="60000"/>
+              <a:lumOff val="40000"/>
+            </a:schemeClr>
+          </a:solidFill>
+        </p:spPr>
+        <p:style>
+          <a:lnRef idx="2">
+            <a:schemeClr val="accent2">
+              <a:shade val="50000"/>
+            </a:schemeClr>
+          </a:lnRef>
+          <a:fillRef idx="1">
+            <a:schemeClr val="accent2"/>
+          </a:fillRef>
+          <a:effectRef idx="0">
+            <a:schemeClr val="accent2"/>
+          </a:effectRef>
+          <a:fontRef idx="minor">
+            <a:schemeClr val="lt1"/>
+          </a:fontRef>
+        </p:style>
+        <p:txBody>
+          <a:bodyPr rtlCol="0" anchor="ctr"/>
+          <a:lstStyle/>
+          <a:p>
+            <a:pPr algn="ctr"/>
+            <a:endParaRPr lang="en-US"/>
+          </a:p>
+        </p:txBody>
+      </p:sp>
+      <p:sp>
+        <p:nvSpPr>
+          <p:cNvPr id="86" name="TextBox 85">
+            <a:extLst>
+              <a:ext uri="{FF2B5EF4-FFF2-40B4-BE49-F238E27FC236}">
+                <a16:creationId xmlns:a16="http://schemas.microsoft.com/office/drawing/2014/main" id="{D2B238D3-26FC-972C-60BE-CC6183749662}"/>
+              </a:ext>
+            </a:extLst>
+          </p:cNvPr>
+          <p:cNvSpPr txBox="1"/>
+          <p:nvPr/>
+        </p:nvSpPr>
+        <p:spPr>
+          <a:xfrm>
+            <a:off x="7553726" y="3357708"/>
+            <a:ext cx="1167906" cy="461665"/>
+          </a:xfrm>
+          <a:prstGeom prst="rect">
+            <a:avLst/>
+          </a:prstGeom>
+          <a:solidFill>
+            <a:schemeClr val="bg1"/>
+          </a:solidFill>
+        </p:spPr>
+        <p:txBody>
+          <a:bodyPr wrap="square" rtlCol="0">
+            <a:spAutoFit/>
+          </a:bodyPr>
+          <a:lstStyle/>
+          <a:p>
+            <a:pPr algn="ctr"/>
+            <a:r>
+              <a:rPr lang="en-US" sz="1200" b="1" dirty="0">
+                <a:solidFill>
+                  <a:schemeClr val="accent2"/>
+                </a:solidFill>
+              </a:rPr>
+              <a:t>DHW Demand Splitter</a:t>
+            </a:r>
+          </a:p>
+        </p:txBody>
+      </p:sp>
+      <p:sp>
+        <p:nvSpPr>
+          <p:cNvPr id="57" name="TextBox 56">
+            <a:extLst>
+              <a:ext uri="{FF2B5EF4-FFF2-40B4-BE49-F238E27FC236}">
+                <a16:creationId xmlns:a16="http://schemas.microsoft.com/office/drawing/2014/main" id="{2D6E9DE1-FB3C-43E4-BE01-35FB692A890A}"/>
+              </a:ext>
+            </a:extLst>
+          </p:cNvPr>
+          <p:cNvSpPr txBox="1"/>
+          <p:nvPr/>
+        </p:nvSpPr>
+        <p:spPr>
+          <a:xfrm>
+            <a:off x="8326263" y="1199670"/>
+            <a:ext cx="1202160" cy="400110"/>
+          </a:xfrm>
+          <a:prstGeom prst="rect">
+            <a:avLst/>
+          </a:prstGeom>
+          <a:noFill/>
+        </p:spPr>
+        <p:txBody>
+          <a:bodyPr wrap="square" rtlCol="0">
+            <a:spAutoFit/>
+          </a:bodyPr>
+          <a:lstStyle/>
+          <a:p>
+            <a:pPr algn="ctr"/>
+            <a:r>
+              <a:rPr lang="en-US" sz="1000" dirty="0">
+                <a:solidFill>
+                  <a:schemeClr val="accent1"/>
+                </a:solidFill>
+              </a:rPr>
+              <a:t>DHW Supply Outlet Pipe Inlet Node</a:t>
+            </a:r>
+          </a:p>
+        </p:txBody>
+      </p:sp>
+      <p:sp>
+        <p:nvSpPr>
+          <p:cNvPr id="129" name="Oval 128">
+            <a:extLst>
+              <a:ext uri="{FF2B5EF4-FFF2-40B4-BE49-F238E27FC236}">
+                <a16:creationId xmlns:a16="http://schemas.microsoft.com/office/drawing/2014/main" id="{8F02A9A3-1AAA-EA29-7438-2AE9FE72A7E1}"/>
+              </a:ext>
+            </a:extLst>
+          </p:cNvPr>
+          <p:cNvSpPr/>
+          <p:nvPr/>
+        </p:nvSpPr>
+        <p:spPr>
+          <a:xfrm>
+            <a:off x="6897610" y="4297966"/>
+            <a:ext cx="133165" cy="114156"/>
+          </a:xfrm>
+          <a:prstGeom prst="ellipse">
+            <a:avLst/>
+          </a:prstGeom>
+        </p:spPr>
+        <p:style>
+          <a:lnRef idx="2">
+            <a:schemeClr val="accent1">
+              <a:shade val="50000"/>
+            </a:schemeClr>
+          </a:lnRef>
+          <a:fillRef idx="1">
+            <a:schemeClr val="accent1"/>
+          </a:fillRef>
+          <a:effectRef idx="0">
+            <a:schemeClr val="accent1"/>
+          </a:effectRef>
+          <a:fontRef idx="minor">
+            <a:schemeClr val="lt1"/>
+          </a:fontRef>
+        </p:style>
+        <p:txBody>
+          <a:bodyPr rtlCol="0" anchor="ctr"/>
+          <a:lstStyle/>
+          <a:p>
+            <a:pPr algn="ctr"/>
+            <a:endParaRPr lang="en-US"/>
+          </a:p>
+        </p:txBody>
+      </p:sp>
+      <p:sp>
+        <p:nvSpPr>
+          <p:cNvPr id="130" name="TextBox 129">
+            <a:extLst>
+              <a:ext uri="{FF2B5EF4-FFF2-40B4-BE49-F238E27FC236}">
+                <a16:creationId xmlns:a16="http://schemas.microsoft.com/office/drawing/2014/main" id="{31DD5B7A-7190-E38D-1B52-CDC6F4FFA6B6}"/>
+              </a:ext>
+            </a:extLst>
+          </p:cNvPr>
+          <p:cNvSpPr txBox="1"/>
+          <p:nvPr/>
+        </p:nvSpPr>
+        <p:spPr>
+          <a:xfrm>
+            <a:off x="6392387" y="4379762"/>
+            <a:ext cx="1338360" cy="400110"/>
+          </a:xfrm>
+          <a:prstGeom prst="rect">
+            <a:avLst/>
+          </a:prstGeom>
+          <a:noFill/>
+        </p:spPr>
+        <p:txBody>
+          <a:bodyPr wrap="square" rtlCol="0">
+            <a:spAutoFit/>
+          </a:bodyPr>
+          <a:lstStyle/>
+          <a:p>
+            <a:pPr algn="ctr"/>
+            <a:r>
+              <a:rPr lang="en-US" sz="1000" dirty="0">
+                <a:solidFill>
+                  <a:schemeClr val="accent1"/>
+                </a:solidFill>
+              </a:rPr>
+              <a:t>Total Hot Water Load Inlet Node</a:t>
+            </a:r>
+          </a:p>
+        </p:txBody>
+      </p:sp>
+      <p:cxnSp>
+        <p:nvCxnSpPr>
+          <p:cNvPr id="131" name="Straight Connector 130">
+            <a:extLst>
+              <a:ext uri="{FF2B5EF4-FFF2-40B4-BE49-F238E27FC236}">
+                <a16:creationId xmlns:a16="http://schemas.microsoft.com/office/drawing/2014/main" id="{C6294E2C-E4CD-84BD-8D4F-1C839495A64C}"/>
+              </a:ext>
+            </a:extLst>
+          </p:cNvPr>
+          <p:cNvCxnSpPr>
+            <a:cxnSpLocks/>
+            <a:stCxn id="179" idx="0"/>
+            <a:endCxn id="132" idx="1"/>
+          </p:cNvCxnSpPr>
+          <p:nvPr/>
+        </p:nvCxnSpPr>
+        <p:spPr>
+          <a:xfrm flipV="1">
+            <a:off x="4136530" y="4346105"/>
+            <a:ext cx="1560626" cy="1"/>
+          </a:xfrm>
+          <a:prstGeom prst="line">
+            <a:avLst/>
+          </a:prstGeom>
+        </p:spPr>
+        <p:style>
+          <a:lnRef idx="1">
+            <a:schemeClr val="accent1"/>
+          </a:lnRef>
+          <a:fillRef idx="0">
+            <a:schemeClr val="accent1"/>
+          </a:fillRef>
+          <a:effectRef idx="0">
+            <a:schemeClr val="accent1"/>
+          </a:effectRef>
+          <a:fontRef idx="minor">
+            <a:schemeClr val="tx1"/>
+          </a:fontRef>
+        </p:style>
+      </p:cxnSp>
+      <p:sp>
+        <p:nvSpPr>
+          <p:cNvPr id="132" name="Rectangle 131">
+            <a:extLst>
+              <a:ext uri="{FF2B5EF4-FFF2-40B4-BE49-F238E27FC236}">
+                <a16:creationId xmlns:a16="http://schemas.microsoft.com/office/drawing/2014/main" id="{50C44F06-4F8B-6ABF-B7AC-AAB1CEBA3D00}"/>
+              </a:ext>
+            </a:extLst>
+          </p:cNvPr>
+          <p:cNvSpPr/>
+          <p:nvPr/>
+        </p:nvSpPr>
+        <p:spPr>
+          <a:xfrm>
+            <a:off x="5697156" y="4091821"/>
+            <a:ext cx="639092" cy="508568"/>
+          </a:xfrm>
+          <a:prstGeom prst="rect">
+            <a:avLst/>
+          </a:prstGeom>
+          <a:solidFill>
+            <a:schemeClr val="bg1">
+              <a:lumMod val="65000"/>
+            </a:schemeClr>
+          </a:solidFill>
+        </p:spPr>
+        <p:style>
+          <a:lnRef idx="2">
+            <a:schemeClr val="accent1">
+              <a:shade val="50000"/>
+            </a:schemeClr>
+          </a:lnRef>
+          <a:fillRef idx="1">
+            <a:schemeClr val="accent1"/>
+          </a:fillRef>
+          <a:effectRef idx="0">
+            <a:schemeClr val="accent1"/>
+          </a:effectRef>
+          <a:fontRef idx="minor">
+            <a:schemeClr val="lt1"/>
+          </a:fontRef>
+        </p:style>
+        <p:txBody>
+          <a:bodyPr rtlCol="0" anchor="ctr"/>
+          <a:lstStyle/>
+          <a:p>
+            <a:pPr algn="ctr"/>
+            <a:r>
+              <a:rPr lang="en-US" sz="800" b="1" dirty="0">
+                <a:solidFill>
+                  <a:schemeClr val="tx1"/>
+                </a:solidFill>
+              </a:rPr>
+              <a:t>DHW Total Hot Water Load</a:t>
+            </a:r>
+          </a:p>
+        </p:txBody>
+      </p:sp>
+      <p:sp>
+        <p:nvSpPr>
+          <p:cNvPr id="133" name="Oval 132">
+            <a:extLst>
+              <a:ext uri="{FF2B5EF4-FFF2-40B4-BE49-F238E27FC236}">
+                <a16:creationId xmlns:a16="http://schemas.microsoft.com/office/drawing/2014/main" id="{EABF45C5-F313-7082-AFF2-570781387A38}"/>
+              </a:ext>
+            </a:extLst>
+          </p:cNvPr>
+          <p:cNvSpPr/>
+          <p:nvPr/>
+        </p:nvSpPr>
+        <p:spPr>
+          <a:xfrm>
+            <a:off x="5122566" y="4281275"/>
+            <a:ext cx="133165" cy="114156"/>
+          </a:xfrm>
+          <a:prstGeom prst="ellipse">
+            <a:avLst/>
+          </a:prstGeom>
+        </p:spPr>
+        <p:style>
+          <a:lnRef idx="2">
+            <a:schemeClr val="accent1">
+              <a:shade val="50000"/>
+            </a:schemeClr>
+          </a:lnRef>
+          <a:fillRef idx="1">
+            <a:schemeClr val="accent1"/>
+          </a:fillRef>
+          <a:effectRef idx="0">
+            <a:schemeClr val="accent1"/>
+          </a:effectRef>
+          <a:fontRef idx="minor">
+            <a:schemeClr val="lt1"/>
+          </a:fontRef>
+        </p:style>
+        <p:txBody>
+          <a:bodyPr rtlCol="0" anchor="ctr"/>
+          <a:lstStyle/>
+          <a:p>
+            <a:pPr algn="ctr"/>
+            <a:endParaRPr lang="en-US"/>
+          </a:p>
+        </p:txBody>
+      </p:sp>
+      <p:sp>
+        <p:nvSpPr>
+          <p:cNvPr id="134" name="TextBox 133">
+            <a:extLst>
+              <a:ext uri="{FF2B5EF4-FFF2-40B4-BE49-F238E27FC236}">
+                <a16:creationId xmlns:a16="http://schemas.microsoft.com/office/drawing/2014/main" id="{7EB07712-9B12-5159-7436-B70B120E1EC4}"/>
+              </a:ext>
+            </a:extLst>
+          </p:cNvPr>
+          <p:cNvSpPr txBox="1"/>
+          <p:nvPr/>
+        </p:nvSpPr>
+        <p:spPr>
+          <a:xfrm>
+            <a:off x="4298979" y="4381578"/>
+            <a:ext cx="1384382" cy="400110"/>
+          </a:xfrm>
+          <a:prstGeom prst="rect">
+            <a:avLst/>
+          </a:prstGeom>
+          <a:noFill/>
+        </p:spPr>
+        <p:txBody>
+          <a:bodyPr wrap="square" rtlCol="0">
+            <a:spAutoFit/>
+          </a:bodyPr>
+          <a:lstStyle/>
+          <a:p>
+            <a:pPr algn="ctr"/>
+            <a:r>
+              <a:rPr lang="en-US" sz="1000" dirty="0">
+                <a:solidFill>
+                  <a:schemeClr val="accent1"/>
+                </a:solidFill>
+              </a:rPr>
+              <a:t>Total Hot Water Load Outlet Node</a:t>
+            </a:r>
+          </a:p>
+        </p:txBody>
+      </p:sp>
+      <p:sp>
+        <p:nvSpPr>
+          <p:cNvPr id="135" name="Rectangle 134">
+            <a:extLst>
+              <a:ext uri="{FF2B5EF4-FFF2-40B4-BE49-F238E27FC236}">
+                <a16:creationId xmlns:a16="http://schemas.microsoft.com/office/drawing/2014/main" id="{BE115B53-FFB3-C68D-DE73-3F97F0AC6EE6}"/>
+              </a:ext>
+            </a:extLst>
+          </p:cNvPr>
+          <p:cNvSpPr/>
+          <p:nvPr/>
+        </p:nvSpPr>
+        <p:spPr>
+          <a:xfrm>
+            <a:off x="4775181" y="3995326"/>
+            <a:ext cx="2619077" cy="784545"/>
+          </a:xfrm>
+          <a:prstGeom prst="rect">
+            <a:avLst/>
+          </a:prstGeom>
+          <a:noFill/>
+          <a:ln>
+            <a:prstDash val="sysDash"/>
+          </a:ln>
+        </p:spPr>
+        <p:style>
+          <a:lnRef idx="2">
+            <a:schemeClr val="accent1">
+              <a:shade val="50000"/>
+            </a:schemeClr>
+          </a:lnRef>
+          <a:fillRef idx="1">
+            <a:schemeClr val="accent1"/>
+          </a:fillRef>
+          <a:effectRef idx="0">
+            <a:schemeClr val="accent1"/>
+          </a:effectRef>
+          <a:fontRef idx="minor">
+            <a:schemeClr val="lt1"/>
+          </a:fontRef>
+        </p:style>
+        <p:txBody>
+          <a:bodyPr rtlCol="0" anchor="ctr"/>
+          <a:lstStyle/>
+          <a:p>
+            <a:pPr algn="ctr"/>
+            <a:endParaRPr lang="en-US"/>
+          </a:p>
+        </p:txBody>
+      </p:sp>
+      <p:sp>
+        <p:nvSpPr>
+          <p:cNvPr id="136" name="TextBox 135">
+            <a:extLst>
+              <a:ext uri="{FF2B5EF4-FFF2-40B4-BE49-F238E27FC236}">
+                <a16:creationId xmlns:a16="http://schemas.microsoft.com/office/drawing/2014/main" id="{9DC08BDA-213F-FFE4-9A4A-4D8A2B3001D0}"/>
+              </a:ext>
+            </a:extLst>
+          </p:cNvPr>
+          <p:cNvSpPr txBox="1"/>
+          <p:nvPr/>
+        </p:nvSpPr>
+        <p:spPr>
+          <a:xfrm>
+            <a:off x="4993436" y="3827467"/>
+            <a:ext cx="2043668" cy="261610"/>
+          </a:xfrm>
+          <a:prstGeom prst="rect">
+            <a:avLst/>
+          </a:prstGeom>
+          <a:solidFill>
+            <a:schemeClr val="bg1"/>
+          </a:solidFill>
+        </p:spPr>
+        <p:txBody>
+          <a:bodyPr wrap="square" rtlCol="0">
+            <a:spAutoFit/>
+          </a:bodyPr>
+          <a:lstStyle/>
+          <a:p>
+            <a:pPr algn="ctr"/>
+            <a:r>
+              <a:rPr lang="en-US" sz="1100" b="1" dirty="0">
+                <a:solidFill>
+                  <a:schemeClr val="accent1"/>
+                </a:solidFill>
+              </a:rPr>
+              <a:t>Hot Water Load Branch</a:t>
+            </a:r>
+          </a:p>
+        </p:txBody>
+      </p:sp>
+      <p:cxnSp>
+        <p:nvCxnSpPr>
+          <p:cNvPr id="137" name="Straight Connector 136">
+            <a:extLst>
+              <a:ext uri="{FF2B5EF4-FFF2-40B4-BE49-F238E27FC236}">
+                <a16:creationId xmlns:a16="http://schemas.microsoft.com/office/drawing/2014/main" id="{68D7DA68-1469-BE23-1BAB-91B1CD5EE932}"/>
+              </a:ext>
+            </a:extLst>
+          </p:cNvPr>
+          <p:cNvCxnSpPr>
+            <a:cxnSpLocks/>
+            <a:endCxn id="84" idx="0"/>
+          </p:cNvCxnSpPr>
+          <p:nvPr/>
+        </p:nvCxnSpPr>
+        <p:spPr>
+          <a:xfrm flipV="1">
+            <a:off x="6409359" y="4327580"/>
+            <a:ext cx="1518942" cy="3022"/>
+          </a:xfrm>
+          <a:prstGeom prst="line">
+            <a:avLst/>
+          </a:prstGeom>
+        </p:spPr>
+        <p:style>
+          <a:lnRef idx="1">
+            <a:schemeClr val="accent1"/>
+          </a:lnRef>
+          <a:fillRef idx="0">
+            <a:schemeClr val="accent1"/>
+          </a:fillRef>
+          <a:effectRef idx="0">
+            <a:schemeClr val="accent1"/>
+          </a:effectRef>
+          <a:fontRef idx="minor">
+            <a:schemeClr val="tx1"/>
+          </a:fontRef>
+        </p:style>
+      </p:cxnSp>
+      <p:sp>
+        <p:nvSpPr>
+          <p:cNvPr id="179" name="Flowchart: Manual Operation 178">
+            <a:extLst>
+              <a:ext uri="{FF2B5EF4-FFF2-40B4-BE49-F238E27FC236}">
+                <a16:creationId xmlns:a16="http://schemas.microsoft.com/office/drawing/2014/main" id="{47C88A09-5188-74D6-4AA1-E06BA37A240E}"/>
+              </a:ext>
+            </a:extLst>
+          </p:cNvPr>
+          <p:cNvSpPr/>
+          <p:nvPr/>
+        </p:nvSpPr>
+        <p:spPr>
+          <a:xfrm rot="5400000">
+            <a:off x="3469706" y="4079376"/>
+            <a:ext cx="800188" cy="533459"/>
+          </a:xfrm>
+          <a:prstGeom prst="flowChartManualOperation">
+            <a:avLst/>
+          </a:prstGeom>
+        </p:spPr>
+        <p:style>
+          <a:lnRef idx="2">
+            <a:schemeClr val="accent2">
+              <a:shade val="50000"/>
+            </a:schemeClr>
+          </a:lnRef>
+          <a:fillRef idx="1">
+            <a:schemeClr val="accent2"/>
+          </a:fillRef>
+          <a:effectRef idx="0">
+            <a:schemeClr val="accent2"/>
+          </a:effectRef>
+          <a:fontRef idx="minor">
+            <a:schemeClr val="lt1"/>
+          </a:fontRef>
+        </p:style>
+        <p:txBody>
+          <a:bodyPr rtlCol="0" anchor="ctr"/>
+          <a:lstStyle/>
+          <a:p>
+            <a:pPr algn="ctr"/>
+            <a:endParaRPr lang="en-US"/>
+          </a:p>
+        </p:txBody>
+      </p:sp>
+      <p:sp>
+        <p:nvSpPr>
+          <p:cNvPr id="206" name="Oval 205">
+            <a:extLst>
+              <a:ext uri="{FF2B5EF4-FFF2-40B4-BE49-F238E27FC236}">
+                <a16:creationId xmlns:a16="http://schemas.microsoft.com/office/drawing/2014/main" id="{DA279A3C-F99B-446D-8CB4-91FB632F0125}"/>
+              </a:ext>
+            </a:extLst>
+          </p:cNvPr>
+          <p:cNvSpPr/>
+          <p:nvPr/>
+        </p:nvSpPr>
+        <p:spPr>
+          <a:xfrm>
+            <a:off x="2988412" y="4322070"/>
+            <a:ext cx="133165" cy="114156"/>
+          </a:xfrm>
+          <a:prstGeom prst="ellipse">
+            <a:avLst/>
+          </a:prstGeom>
+        </p:spPr>
+        <p:style>
+          <a:lnRef idx="2">
+            <a:schemeClr val="accent1">
+              <a:shade val="50000"/>
+            </a:schemeClr>
+          </a:lnRef>
+          <a:fillRef idx="1">
+            <a:schemeClr val="accent1"/>
+          </a:fillRef>
+          <a:effectRef idx="0">
+            <a:schemeClr val="accent1"/>
+          </a:effectRef>
+          <a:fontRef idx="minor">
+            <a:schemeClr val="lt1"/>
+          </a:fontRef>
+        </p:style>
+        <p:txBody>
+          <a:bodyPr rtlCol="0" anchor="ctr"/>
+          <a:lstStyle/>
+          <a:p>
+            <a:pPr algn="ctr"/>
+            <a:endParaRPr lang="en-US"/>
+          </a:p>
+        </p:txBody>
+      </p:sp>
+      <p:sp>
+        <p:nvSpPr>
+          <p:cNvPr id="207" name="TextBox 206">
+            <a:extLst>
+              <a:ext uri="{FF2B5EF4-FFF2-40B4-BE49-F238E27FC236}">
+                <a16:creationId xmlns:a16="http://schemas.microsoft.com/office/drawing/2014/main" id="{2EADE19D-0703-95DC-FCB3-61FF60719BC0}"/>
+              </a:ext>
+            </a:extLst>
+          </p:cNvPr>
+          <p:cNvSpPr txBox="1"/>
+          <p:nvPr/>
+        </p:nvSpPr>
+        <p:spPr>
+          <a:xfrm>
+            <a:off x="2585959" y="4470336"/>
+            <a:ext cx="938073" cy="553998"/>
+          </a:xfrm>
+          <a:prstGeom prst="rect">
+            <a:avLst/>
+          </a:prstGeom>
+          <a:noFill/>
+        </p:spPr>
+        <p:txBody>
+          <a:bodyPr wrap="square" rtlCol="0">
+            <a:spAutoFit/>
+          </a:bodyPr>
+          <a:lstStyle/>
+          <a:p>
+            <a:pPr algn="ctr"/>
+            <a:r>
+              <a:rPr lang="en-US" sz="1000" dirty="0">
+                <a:solidFill>
+                  <a:schemeClr val="accent1"/>
+                </a:solidFill>
+              </a:rPr>
+              <a:t>Mains Makeup Pipe Inlet Node</a:t>
+            </a:r>
+          </a:p>
+        </p:txBody>
+      </p:sp>
+      <p:cxnSp>
+        <p:nvCxnSpPr>
+          <p:cNvPr id="208" name="Straight Connector 207">
+            <a:extLst>
+              <a:ext uri="{FF2B5EF4-FFF2-40B4-BE49-F238E27FC236}">
+                <a16:creationId xmlns:a16="http://schemas.microsoft.com/office/drawing/2014/main" id="{7AE84E29-9214-6405-FBDC-7E983A0AD0B8}"/>
+              </a:ext>
+            </a:extLst>
+          </p:cNvPr>
+          <p:cNvCxnSpPr>
+            <a:cxnSpLocks/>
+            <a:endCxn id="209" idx="1"/>
+          </p:cNvCxnSpPr>
+          <p:nvPr/>
+        </p:nvCxnSpPr>
+        <p:spPr>
+          <a:xfrm>
+            <a:off x="637918" y="4338355"/>
+            <a:ext cx="1109665" cy="7751"/>
+          </a:xfrm>
+          <a:prstGeom prst="line">
+            <a:avLst/>
+          </a:prstGeom>
+        </p:spPr>
+        <p:style>
+          <a:lnRef idx="1">
+            <a:schemeClr val="accent1"/>
+          </a:lnRef>
+          <a:fillRef idx="0">
+            <a:schemeClr val="accent1"/>
+          </a:fillRef>
+          <a:effectRef idx="0">
+            <a:schemeClr val="accent1"/>
+          </a:effectRef>
+          <a:fontRef idx="minor">
+            <a:schemeClr val="tx1"/>
+          </a:fontRef>
+        </p:style>
+      </p:cxnSp>
+      <p:sp>
+        <p:nvSpPr>
+          <p:cNvPr id="209" name="Rectangle 208">
+            <a:extLst>
+              <a:ext uri="{FF2B5EF4-FFF2-40B4-BE49-F238E27FC236}">
+                <a16:creationId xmlns:a16="http://schemas.microsoft.com/office/drawing/2014/main" id="{577C94B8-AB05-AD1D-73B0-858B702A5657}"/>
+              </a:ext>
+            </a:extLst>
+          </p:cNvPr>
+          <p:cNvSpPr/>
+          <p:nvPr/>
+        </p:nvSpPr>
+        <p:spPr>
+          <a:xfrm>
+            <a:off x="1747583" y="4045924"/>
+            <a:ext cx="720436" cy="600364"/>
+          </a:xfrm>
+          <a:prstGeom prst="rect">
+            <a:avLst/>
+          </a:prstGeom>
+          <a:solidFill>
+            <a:schemeClr val="bg1">
+              <a:lumMod val="65000"/>
+            </a:schemeClr>
+          </a:solidFill>
+        </p:spPr>
+        <p:style>
+          <a:lnRef idx="2">
+            <a:schemeClr val="accent1">
+              <a:shade val="50000"/>
+            </a:schemeClr>
+          </a:lnRef>
+          <a:fillRef idx="1">
+            <a:schemeClr val="accent1"/>
+          </a:fillRef>
+          <a:effectRef idx="0">
+            <a:schemeClr val="accent1"/>
+          </a:effectRef>
+          <a:fontRef idx="minor">
+            <a:schemeClr val="lt1"/>
+          </a:fontRef>
+        </p:style>
+        <p:txBody>
+          <a:bodyPr rtlCol="0" anchor="ctr"/>
+          <a:lstStyle/>
+          <a:p>
+            <a:pPr algn="ctr"/>
+            <a:r>
+              <a:rPr lang="en-US" sz="1000" b="1" dirty="0">
+                <a:solidFill>
+                  <a:schemeClr val="tx1"/>
+                </a:solidFill>
+              </a:rPr>
+              <a:t>Mains Makeup Pipe</a:t>
+            </a:r>
+          </a:p>
+        </p:txBody>
+      </p:sp>
+      <p:sp>
+        <p:nvSpPr>
+          <p:cNvPr id="210" name="Oval 209">
+            <a:extLst>
+              <a:ext uri="{FF2B5EF4-FFF2-40B4-BE49-F238E27FC236}">
+                <a16:creationId xmlns:a16="http://schemas.microsoft.com/office/drawing/2014/main" id="{BC731D02-1B1B-2729-CFB9-7979FBF23BD8}"/>
+              </a:ext>
+            </a:extLst>
+          </p:cNvPr>
+          <p:cNvSpPr/>
+          <p:nvPr/>
+        </p:nvSpPr>
+        <p:spPr>
+          <a:xfrm>
+            <a:off x="1213368" y="4305379"/>
+            <a:ext cx="133165" cy="114156"/>
+          </a:xfrm>
+          <a:prstGeom prst="ellipse">
+            <a:avLst/>
+          </a:prstGeom>
+        </p:spPr>
+        <p:style>
+          <a:lnRef idx="2">
+            <a:schemeClr val="accent1">
+              <a:shade val="50000"/>
+            </a:schemeClr>
+          </a:lnRef>
+          <a:fillRef idx="1">
+            <a:schemeClr val="accent1"/>
+          </a:fillRef>
+          <a:effectRef idx="0">
+            <a:schemeClr val="accent1"/>
+          </a:effectRef>
+          <a:fontRef idx="minor">
+            <a:schemeClr val="lt1"/>
+          </a:fontRef>
+        </p:style>
+        <p:txBody>
+          <a:bodyPr rtlCol="0" anchor="ctr"/>
+          <a:lstStyle/>
+          <a:p>
+            <a:pPr algn="ctr"/>
+            <a:endParaRPr lang="en-US"/>
+          </a:p>
+        </p:txBody>
+      </p:sp>
+      <p:sp>
+        <p:nvSpPr>
+          <p:cNvPr id="211" name="TextBox 210">
+            <a:extLst>
+              <a:ext uri="{FF2B5EF4-FFF2-40B4-BE49-F238E27FC236}">
+                <a16:creationId xmlns:a16="http://schemas.microsoft.com/office/drawing/2014/main" id="{89FB7197-D4E0-5A31-E0C3-90F0EC3FADE8}"/>
+              </a:ext>
+            </a:extLst>
+          </p:cNvPr>
+          <p:cNvSpPr txBox="1"/>
+          <p:nvPr/>
+        </p:nvSpPr>
+        <p:spPr>
+          <a:xfrm>
+            <a:off x="827011" y="4516998"/>
+            <a:ext cx="938073" cy="400110"/>
+          </a:xfrm>
+          <a:prstGeom prst="rect">
+            <a:avLst/>
+          </a:prstGeom>
+          <a:noFill/>
+        </p:spPr>
+        <p:txBody>
+          <a:bodyPr wrap="square" rtlCol="0">
+            <a:spAutoFit/>
+          </a:bodyPr>
+          <a:lstStyle/>
+          <a:p>
+            <a:pPr algn="ctr"/>
+            <a:r>
+              <a:rPr lang="en-US" sz="1000" dirty="0">
+                <a:solidFill>
+                  <a:schemeClr val="accent1"/>
+                </a:solidFill>
+              </a:rPr>
+              <a:t>Mains Makeup Node</a:t>
+            </a:r>
+          </a:p>
+        </p:txBody>
+      </p:sp>
+      <p:sp>
+        <p:nvSpPr>
+          <p:cNvPr id="212" name="Rectangle 211">
+            <a:extLst>
+              <a:ext uri="{FF2B5EF4-FFF2-40B4-BE49-F238E27FC236}">
+                <a16:creationId xmlns:a16="http://schemas.microsoft.com/office/drawing/2014/main" id="{DEF7985D-6593-FAF8-C4FF-0515C11863CB}"/>
+              </a:ext>
+            </a:extLst>
+          </p:cNvPr>
+          <p:cNvSpPr/>
+          <p:nvPr/>
+        </p:nvSpPr>
+        <p:spPr>
+          <a:xfrm>
+            <a:off x="865983" y="3564137"/>
+            <a:ext cx="2619077" cy="1563936"/>
+          </a:xfrm>
+          <a:prstGeom prst="rect">
+            <a:avLst/>
+          </a:prstGeom>
+          <a:noFill/>
+          <a:ln>
+            <a:prstDash val="sysDash"/>
+          </a:ln>
+        </p:spPr>
+        <p:style>
+          <a:lnRef idx="2">
+            <a:schemeClr val="accent1">
+              <a:shade val="50000"/>
+            </a:schemeClr>
+          </a:lnRef>
+          <a:fillRef idx="1">
+            <a:schemeClr val="accent1"/>
+          </a:fillRef>
+          <a:effectRef idx="0">
+            <a:schemeClr val="accent1"/>
+          </a:effectRef>
+          <a:fontRef idx="minor">
+            <a:schemeClr val="lt1"/>
+          </a:fontRef>
+        </p:style>
+        <p:txBody>
+          <a:bodyPr rtlCol="0" anchor="ctr"/>
+          <a:lstStyle/>
+          <a:p>
+            <a:pPr algn="ctr"/>
+            <a:endParaRPr lang="en-US"/>
+          </a:p>
+        </p:txBody>
+      </p:sp>
+      <p:sp>
+        <p:nvSpPr>
+          <p:cNvPr id="213" name="TextBox 212">
+            <a:extLst>
+              <a:ext uri="{FF2B5EF4-FFF2-40B4-BE49-F238E27FC236}">
+                <a16:creationId xmlns:a16="http://schemas.microsoft.com/office/drawing/2014/main" id="{24BC81F3-10B9-8436-41AD-B5A4373B2AC9}"/>
+              </a:ext>
+            </a:extLst>
+          </p:cNvPr>
+          <p:cNvSpPr txBox="1"/>
+          <p:nvPr/>
+        </p:nvSpPr>
+        <p:spPr>
+          <a:xfrm>
+            <a:off x="1513204" y="3327466"/>
+            <a:ext cx="1199416" cy="461665"/>
+          </a:xfrm>
+          <a:prstGeom prst="rect">
+            <a:avLst/>
+          </a:prstGeom>
+          <a:solidFill>
+            <a:schemeClr val="bg1"/>
+          </a:solidFill>
+        </p:spPr>
+        <p:txBody>
+          <a:bodyPr wrap="square" rtlCol="0">
+            <a:spAutoFit/>
+          </a:bodyPr>
+          <a:lstStyle/>
+          <a:p>
+            <a:pPr algn="ctr"/>
+            <a:r>
+              <a:rPr lang="en-US" sz="1200" b="1" dirty="0">
+                <a:solidFill>
+                  <a:schemeClr val="accent1"/>
+                </a:solidFill>
+              </a:rPr>
+              <a:t>Mains Makeup Branch</a:t>
+            </a:r>
+          </a:p>
+        </p:txBody>
+      </p:sp>
+      <p:cxnSp>
+        <p:nvCxnSpPr>
+          <p:cNvPr id="214" name="Straight Connector 213">
+            <a:extLst>
+              <a:ext uri="{FF2B5EF4-FFF2-40B4-BE49-F238E27FC236}">
+                <a16:creationId xmlns:a16="http://schemas.microsoft.com/office/drawing/2014/main" id="{EF9B46BE-2F65-DF03-8DDB-FD5DD8EDC032}"/>
+              </a:ext>
+            </a:extLst>
+          </p:cNvPr>
+          <p:cNvCxnSpPr>
+            <a:cxnSpLocks/>
+            <a:stCxn id="209" idx="3"/>
+            <a:endCxn id="179" idx="2"/>
+          </p:cNvCxnSpPr>
+          <p:nvPr/>
+        </p:nvCxnSpPr>
+        <p:spPr>
+          <a:xfrm>
+            <a:off x="2468019" y="4346106"/>
+            <a:ext cx="1135052" cy="0"/>
+          </a:xfrm>
+          <a:prstGeom prst="line">
+            <a:avLst/>
+          </a:prstGeom>
+        </p:spPr>
+        <p:style>
+          <a:lnRef idx="1">
+            <a:schemeClr val="accent1"/>
+          </a:lnRef>
+          <a:fillRef idx="0">
+            <a:schemeClr val="accent1"/>
+          </a:fillRef>
+          <a:effectRef idx="0">
+            <a:schemeClr val="accent1"/>
+          </a:effectRef>
+          <a:fontRef idx="minor">
+            <a:schemeClr val="tx1"/>
+          </a:fontRef>
+        </p:style>
+      </p:cxnSp>
+      <p:sp>
+        <p:nvSpPr>
+          <p:cNvPr id="219" name="Rectangle 218">
+            <a:extLst>
+              <a:ext uri="{FF2B5EF4-FFF2-40B4-BE49-F238E27FC236}">
+                <a16:creationId xmlns:a16="http://schemas.microsoft.com/office/drawing/2014/main" id="{8A4435A7-D471-17D0-8E2A-F9C7EF2B1A39}"/>
+              </a:ext>
+            </a:extLst>
+          </p:cNvPr>
+          <p:cNvSpPr/>
+          <p:nvPr/>
+        </p:nvSpPr>
+        <p:spPr>
+          <a:xfrm>
+            <a:off x="1536950" y="1882234"/>
+            <a:ext cx="9141846" cy="4916019"/>
+          </a:xfrm>
+          <a:prstGeom prst="rect">
+            <a:avLst/>
+          </a:prstGeom>
+          <a:noFill/>
+          <a:ln w="19050">
+            <a:solidFill>
+              <a:srgbClr val="7030A0"/>
+            </a:solidFill>
+            <a:prstDash val="sysDash"/>
+          </a:ln>
+        </p:spPr>
+        <p:style>
+          <a:lnRef idx="2">
+            <a:schemeClr val="accent1">
+              <a:shade val="50000"/>
+            </a:schemeClr>
+          </a:lnRef>
+          <a:fillRef idx="1">
+            <a:schemeClr val="accent1"/>
+          </a:fillRef>
+          <a:effectRef idx="0">
+            <a:schemeClr val="accent1"/>
+          </a:effectRef>
+          <a:fontRef idx="minor">
+            <a:schemeClr val="lt1"/>
+          </a:fontRef>
+        </p:style>
+        <p:txBody>
+          <a:bodyPr rtlCol="0" anchor="ctr"/>
+          <a:lstStyle/>
+          <a:p>
+            <a:pPr algn="ctr"/>
+            <a:endParaRPr lang="en-US"/>
+          </a:p>
+        </p:txBody>
+      </p:sp>
+      <p:sp>
+        <p:nvSpPr>
+          <p:cNvPr id="220" name="TextBox 219">
+            <a:extLst>
+              <a:ext uri="{FF2B5EF4-FFF2-40B4-BE49-F238E27FC236}">
+                <a16:creationId xmlns:a16="http://schemas.microsoft.com/office/drawing/2014/main" id="{A3DB3F12-418D-47BB-DBA8-9404D283EB20}"/>
+              </a:ext>
+            </a:extLst>
+          </p:cNvPr>
+          <p:cNvSpPr txBox="1"/>
+          <p:nvPr/>
+        </p:nvSpPr>
+        <p:spPr>
+          <a:xfrm>
+            <a:off x="1791186" y="1891986"/>
+            <a:ext cx="1957870" cy="307777"/>
+          </a:xfrm>
+          <a:prstGeom prst="rect">
+            <a:avLst/>
+          </a:prstGeom>
+          <a:solidFill>
+            <a:schemeClr val="bg1"/>
+          </a:solidFill>
+        </p:spPr>
+        <p:txBody>
+          <a:bodyPr wrap="square" rtlCol="0">
+            <a:spAutoFit/>
+          </a:bodyPr>
+          <a:lstStyle/>
+          <a:p>
+            <a:pPr algn="ctr"/>
+            <a:r>
+              <a:rPr lang="en-US" sz="1400" b="1" dirty="0">
+                <a:solidFill>
+                  <a:srgbClr val="7030A0"/>
+                </a:solidFill>
+              </a:rPr>
+              <a:t>Demand Side</a:t>
+            </a:r>
+            <a:endParaRPr lang="en-US" sz="1400" dirty="0">
+              <a:solidFill>
+                <a:srgbClr val="7030A0"/>
+              </a:solidFill>
+            </a:endParaRPr>
+          </a:p>
+        </p:txBody>
+      </p:sp>
+      <p:cxnSp>
+        <p:nvCxnSpPr>
+          <p:cNvPr id="221" name="Straight Connector 220">
+            <a:extLst>
+              <a:ext uri="{FF2B5EF4-FFF2-40B4-BE49-F238E27FC236}">
+                <a16:creationId xmlns:a16="http://schemas.microsoft.com/office/drawing/2014/main" id="{A20D1085-2FE7-9002-F567-ED405E14D618}"/>
+              </a:ext>
+            </a:extLst>
+          </p:cNvPr>
+          <p:cNvCxnSpPr>
+            <a:cxnSpLocks/>
+          </p:cNvCxnSpPr>
+          <p:nvPr/>
+        </p:nvCxnSpPr>
+        <p:spPr>
+          <a:xfrm>
+            <a:off x="621215" y="1149766"/>
+            <a:ext cx="0" cy="3188587"/>
+          </a:xfrm>
+          <a:prstGeom prst="line">
+            <a:avLst/>
+          </a:prstGeom>
+        </p:spPr>
+        <p:style>
+          <a:lnRef idx="1">
+            <a:schemeClr val="accent1"/>
+          </a:lnRef>
+          <a:fillRef idx="0">
+            <a:schemeClr val="accent1"/>
+          </a:fillRef>
+          <a:effectRef idx="0">
+            <a:schemeClr val="accent1"/>
+          </a:effectRef>
+          <a:fontRef idx="minor">
+            <a:schemeClr val="tx1"/>
+          </a:fontRef>
+        </p:style>
+      </p:cxnSp>
+      <p:sp>
+        <p:nvSpPr>
+          <p:cNvPr id="226" name="Flowchart: Extract 225">
+            <a:extLst>
+              <a:ext uri="{FF2B5EF4-FFF2-40B4-BE49-F238E27FC236}">
+                <a16:creationId xmlns:a16="http://schemas.microsoft.com/office/drawing/2014/main" id="{179005D9-B8E6-88D7-CAFD-E091EDB8252B}"/>
+              </a:ext>
+            </a:extLst>
+          </p:cNvPr>
+          <p:cNvSpPr/>
+          <p:nvPr/>
+        </p:nvSpPr>
+        <p:spPr>
+          <a:xfrm>
+            <a:off x="514739" y="2369572"/>
+            <a:ext cx="178786" cy="174425"/>
+          </a:xfrm>
+          <a:prstGeom prst="flowChartExtract">
+            <a:avLst/>
+          </a:prstGeom>
+        </p:spPr>
+        <p:style>
+          <a:lnRef idx="2">
+            <a:schemeClr val="accent1">
+              <a:shade val="50000"/>
+            </a:schemeClr>
+          </a:lnRef>
+          <a:fillRef idx="1">
+            <a:schemeClr val="accent1"/>
+          </a:fillRef>
+          <a:effectRef idx="0">
+            <a:schemeClr val="accent1"/>
+          </a:effectRef>
+          <a:fontRef idx="minor">
+            <a:schemeClr val="lt1"/>
+          </a:fontRef>
+        </p:style>
+        <p:txBody>
+          <a:bodyPr rtlCol="0" anchor="ctr"/>
+          <a:lstStyle/>
+          <a:p>
+            <a:pPr algn="ctr"/>
+            <a:endParaRPr lang="en-US"/>
+          </a:p>
+        </p:txBody>
+      </p:sp>
+      <p:sp>
+        <p:nvSpPr>
+          <p:cNvPr id="227" name="Flowchart: Extract 226">
+            <a:extLst>
+              <a:ext uri="{FF2B5EF4-FFF2-40B4-BE49-F238E27FC236}">
+                <a16:creationId xmlns:a16="http://schemas.microsoft.com/office/drawing/2014/main" id="{8583B94C-317E-FE91-7AA0-15C27B93BC47}"/>
+              </a:ext>
+            </a:extLst>
+          </p:cNvPr>
+          <p:cNvSpPr/>
+          <p:nvPr/>
+        </p:nvSpPr>
+        <p:spPr>
+          <a:xfrm flipV="1">
+            <a:off x="11715412" y="2539858"/>
+            <a:ext cx="178786" cy="174425"/>
+          </a:xfrm>
+          <a:prstGeom prst="flowChartExtract">
+            <a:avLst/>
+          </a:prstGeom>
+        </p:spPr>
+        <p:style>
+          <a:lnRef idx="2">
+            <a:schemeClr val="accent1">
+              <a:shade val="50000"/>
+            </a:schemeClr>
+          </a:lnRef>
+          <a:fillRef idx="1">
+            <a:schemeClr val="accent1"/>
+          </a:fillRef>
+          <a:effectRef idx="0">
+            <a:schemeClr val="accent1"/>
+          </a:effectRef>
+          <a:fontRef idx="minor">
+            <a:schemeClr val="lt1"/>
+          </a:fontRef>
+        </p:style>
+        <p:txBody>
+          <a:bodyPr rtlCol="0" anchor="ctr"/>
+          <a:lstStyle/>
+          <a:p>
+            <a:pPr algn="ctr"/>
+            <a:endParaRPr lang="en-US"/>
+          </a:p>
+        </p:txBody>
+      </p:sp>
+      <p:sp>
+        <p:nvSpPr>
+          <p:cNvPr id="2" name="TextBox 1">
+            <a:extLst>
+              <a:ext uri="{FF2B5EF4-FFF2-40B4-BE49-F238E27FC236}">
+                <a16:creationId xmlns:a16="http://schemas.microsoft.com/office/drawing/2014/main" id="{F9BA4324-0FA8-631B-C173-11301D139FDC}"/>
+              </a:ext>
+            </a:extLst>
+          </p:cNvPr>
+          <p:cNvSpPr txBox="1"/>
+          <p:nvPr/>
+        </p:nvSpPr>
+        <p:spPr>
+          <a:xfrm>
+            <a:off x="599401" y="5694888"/>
+            <a:ext cx="2720156" cy="646331"/>
+          </a:xfrm>
+          <a:prstGeom prst="rect">
+            <a:avLst/>
+          </a:prstGeom>
+          <a:effectLst>
+            <a:outerShdw blurRad="50800" dist="38100" dir="2700000" algn="tl" rotWithShape="0">
+              <a:prstClr val="black">
+                <a:alpha val="40000"/>
+              </a:prstClr>
+            </a:outerShdw>
+          </a:effectLst>
+        </p:spPr>
+        <p:style>
+          <a:lnRef idx="1">
+            <a:schemeClr val="accent4"/>
+          </a:lnRef>
+          <a:fillRef idx="2">
+            <a:schemeClr val="accent4"/>
+          </a:fillRef>
+          <a:effectRef idx="1">
+            <a:schemeClr val="accent4"/>
+          </a:effectRef>
+          <a:fontRef idx="minor">
+            <a:schemeClr val="dk1"/>
+          </a:fontRef>
+        </p:style>
+        <p:txBody>
+          <a:bodyPr wrap="square" rtlCol="0">
+            <a:spAutoFit/>
+          </a:bodyPr>
+          <a:lstStyle/>
+          <a:p>
+            <a:r>
+              <a:rPr lang="en-US" dirty="0"/>
+              <a:t>REEDR Simplified Hot Water Schematic</a:t>
+            </a:r>
+          </a:p>
+        </p:txBody>
+      </p:sp>
+    </p:spTree>
+    <p:extLst>
+      <p:ext uri="{BB962C8B-B14F-4D97-AF65-F5344CB8AC3E}">
+        <p14:creationId xmlns:p14="http://schemas.microsoft.com/office/powerpoint/2010/main" val="1810853302"/>
       </p:ext>
     </p:extLst>
   </p:cSld>

</xml_diff>